<commit_message>
slides week 2 and 1
</commit_message>
<xml_diff>
--- a/Slides/Week 1 - Intro, array, complexity.pptx
+++ b/Slides/Week 1 - Intro, array, complexity.pptx
@@ -251,7 +251,7 @@
           <a:p>
             <a:fld id="{F314420D-16BA-4EDC-9A71-800590EAD5A3}" type="datetimeFigureOut">
               <a:rPr lang="en-GB" smtClean="0"/>
-              <a:t>01/11/2015</a:t>
+              <a:t>15/11/2015</a:t>
             </a:fld>
             <a:endParaRPr lang="en-GB"/>
           </a:p>
@@ -1525,9 +1525,9 @@
           <a:bodyPr/>
           <a:lstStyle/>
           <a:p>
-            <a:fld id="{55FBC885-ED72-41E2-852B-5C1E0730F545}" type="datetime1">
+            <a:fld id="{18C26D5F-E074-46D4-9D12-EC6FA35BF351}" type="datetime1">
               <a:rPr lang="en-GB" smtClean="0"/>
-              <a:t>01/11/2015</a:t>
+              <a:t>15/11/2015</a:t>
             </a:fld>
             <a:endParaRPr lang="en-GB"/>
           </a:p>
@@ -1550,7 +1550,7 @@
           <a:p>
             <a:r>
               <a:rPr lang="it-IT" smtClean="0"/>
-              <a:t>INFDEV016A - G. Costantini, F. Di Giacomo, G. Maggiore</a:t>
+              <a:t>INFDEV026A - G. Costantini, F. Di Giacomo, G. Maggiore</a:t>
             </a:r>
             <a:endParaRPr lang="en-GB"/>
           </a:p>
@@ -1780,9 +1780,9 @@
           <a:bodyPr/>
           <a:lstStyle/>
           <a:p>
-            <a:fld id="{A70C0FF4-D251-4490-9C9B-45097DB3E249}" type="datetime1">
+            <a:fld id="{4B35C3FA-0131-431B-A414-405AEA1D2A71}" type="datetime1">
               <a:rPr lang="en-GB" smtClean="0"/>
-              <a:t>01/11/2015</a:t>
+              <a:t>15/11/2015</a:t>
             </a:fld>
             <a:endParaRPr lang="en-GB"/>
           </a:p>
@@ -1805,7 +1805,7 @@
           <a:p>
             <a:r>
               <a:rPr lang="it-IT" smtClean="0"/>
-              <a:t>INFDEV016A - G. Costantini, F. Di Giacomo, G. Maggiore</a:t>
+              <a:t>INFDEV026A - G. Costantini, F. Di Giacomo, G. Maggiore</a:t>
             </a:r>
             <a:endParaRPr lang="en-GB"/>
           </a:p>
@@ -2098,9 +2098,9 @@
           <a:bodyPr/>
           <a:lstStyle/>
           <a:p>
-            <a:fld id="{DC697B7D-C161-4FFD-8213-F006F45A11F3}" type="datetime1">
+            <a:fld id="{49981D9B-F685-4349-A8A2-2CE7B878EB5A}" type="datetime1">
               <a:rPr lang="en-GB" smtClean="0"/>
-              <a:t>01/11/2015</a:t>
+              <a:t>15/11/2015</a:t>
             </a:fld>
             <a:endParaRPr lang="en-GB"/>
           </a:p>
@@ -2123,7 +2123,7 @@
           <a:p>
             <a:r>
               <a:rPr lang="it-IT" smtClean="0"/>
-              <a:t>INFDEV016A - G. Costantini, F. Di Giacomo, G. Maggiore</a:t>
+              <a:t>INFDEV026A - G. Costantini, F. Di Giacomo, G. Maggiore</a:t>
             </a:r>
             <a:endParaRPr lang="en-GB"/>
           </a:p>
@@ -2429,9 +2429,9 @@
           <a:bodyPr/>
           <a:lstStyle/>
           <a:p>
-            <a:fld id="{9341E81C-7653-4A78-AD44-BE0781A4794E}" type="datetime1">
+            <a:fld id="{3760A31A-2117-43EC-98BD-D093B4BEBF7D}" type="datetime1">
               <a:rPr lang="en-GB" smtClean="0"/>
-              <a:t>01/11/2015</a:t>
+              <a:t>15/11/2015</a:t>
             </a:fld>
             <a:endParaRPr lang="en-GB"/>
           </a:p>
@@ -2454,7 +2454,7 @@
           <a:p>
             <a:r>
               <a:rPr lang="it-IT" smtClean="0"/>
-              <a:t>INFDEV016A - G. Costantini, F. Di Giacomo, G. Maggiore</a:t>
+              <a:t>INFDEV026A - G. Costantini, F. Di Giacomo, G. Maggiore</a:t>
             </a:r>
             <a:endParaRPr lang="en-GB"/>
           </a:p>
@@ -2747,9 +2747,9 @@
           <a:bodyPr/>
           <a:lstStyle/>
           <a:p>
-            <a:fld id="{FA184769-B224-476F-8A3B-90EAF44C390D}" type="datetime1">
+            <a:fld id="{C6E16212-41E4-4C8C-BA02-AE66F4F32210}" type="datetime1">
               <a:rPr lang="en-GB" smtClean="0"/>
-              <a:t>01/11/2015</a:t>
+              <a:t>15/11/2015</a:t>
             </a:fld>
             <a:endParaRPr lang="en-GB"/>
           </a:p>
@@ -2772,7 +2772,7 @@
           <a:p>
             <a:r>
               <a:rPr lang="it-IT" smtClean="0"/>
-              <a:t>INFDEV016A - G. Costantini, F. Di Giacomo, G. Maggiore</a:t>
+              <a:t>INFDEV026A - G. Costantini, F. Di Giacomo, G. Maggiore</a:t>
             </a:r>
             <a:endParaRPr lang="en-GB"/>
           </a:p>
@@ -3138,9 +3138,9 @@
           <a:bodyPr/>
           <a:lstStyle/>
           <a:p>
-            <a:fld id="{942D0082-6034-4D99-9730-C347DEFD5E83}" type="datetime1">
+            <a:fld id="{0519352D-B0C8-4AC5-B195-10F5559BB262}" type="datetime1">
               <a:rPr lang="en-GB" smtClean="0"/>
-              <a:t>01/11/2015</a:t>
+              <a:t>15/11/2015</a:t>
             </a:fld>
             <a:endParaRPr lang="en-GB"/>
           </a:p>
@@ -3163,7 +3163,7 @@
           <a:p>
             <a:r>
               <a:rPr lang="it-IT" smtClean="0"/>
-              <a:t>INFDEV016A - G. Costantini, F. Di Giacomo, G. Maggiore</a:t>
+              <a:t>INFDEV026A - G. Costantini, F. Di Giacomo, G. Maggiore</a:t>
             </a:r>
             <a:endParaRPr lang="en-GB"/>
           </a:p>
@@ -3312,9 +3312,9 @@
           <a:bodyPr/>
           <a:lstStyle/>
           <a:p>
-            <a:fld id="{E53C3E63-DCDC-4261-AA64-65097E6A7069}" type="datetime1">
+            <a:fld id="{05D599E2-E77F-4890-BE0A-B738A12350D6}" type="datetime1">
               <a:rPr lang="en-GB" smtClean="0"/>
-              <a:t>01/11/2015</a:t>
+              <a:t>15/11/2015</a:t>
             </a:fld>
             <a:endParaRPr lang="en-GB"/>
           </a:p>
@@ -3337,7 +3337,7 @@
           <a:p>
             <a:r>
               <a:rPr lang="it-IT" smtClean="0"/>
-              <a:t>INFDEV016A - G. Costantini, F. Di Giacomo, G. Maggiore</a:t>
+              <a:t>INFDEV026A - G. Costantini, F. Di Giacomo, G. Maggiore</a:t>
             </a:r>
             <a:endParaRPr lang="en-GB"/>
           </a:p>
@@ -3496,9 +3496,9 @@
           <a:bodyPr/>
           <a:lstStyle/>
           <a:p>
-            <a:fld id="{098385B4-F417-48D2-853F-B2814A5E85AD}" type="datetime1">
+            <a:fld id="{DCD5088B-EE31-4F65-88C6-15B4DF01B231}" type="datetime1">
               <a:rPr lang="en-GB" smtClean="0"/>
-              <a:t>01/11/2015</a:t>
+              <a:t>15/11/2015</a:t>
             </a:fld>
             <a:endParaRPr lang="en-GB"/>
           </a:p>
@@ -3521,7 +3521,7 @@
           <a:p>
             <a:r>
               <a:rPr lang="it-IT" smtClean="0"/>
-              <a:t>INFDEV016A - G. Costantini, F. Di Giacomo, G. Maggiore</a:t>
+              <a:t>INFDEV026A - G. Costantini, F. Di Giacomo, G. Maggiore</a:t>
             </a:r>
             <a:endParaRPr lang="en-GB"/>
           </a:p>
@@ -3670,9 +3670,9 @@
           <a:bodyPr/>
           <a:lstStyle/>
           <a:p>
-            <a:fld id="{35B0ED23-FE78-4251-B3C8-63A8587DB543}" type="datetime1">
+            <a:fld id="{1DB60045-9CB0-4227-8117-FFD6333F886B}" type="datetime1">
               <a:rPr lang="en-GB" smtClean="0"/>
-              <a:t>01/11/2015</a:t>
+              <a:t>15/11/2015</a:t>
             </a:fld>
             <a:endParaRPr lang="en-GB"/>
           </a:p>
@@ -3695,7 +3695,7 @@
           <a:p>
             <a:r>
               <a:rPr lang="it-IT" smtClean="0"/>
-              <a:t>INFDEV016A - G. Costantini, F. Di Giacomo, G. Maggiore</a:t>
+              <a:t>INFDEV026A - G. Costantini, F. Di Giacomo, G. Maggiore</a:t>
             </a:r>
             <a:endParaRPr lang="en-GB"/>
           </a:p>
@@ -3921,9 +3921,9 @@
           <a:bodyPr/>
           <a:lstStyle/>
           <a:p>
-            <a:fld id="{B8D89FAA-FDDA-4772-B564-6CEEA0D1AE91}" type="datetime1">
+            <a:fld id="{D5CF92DE-63B8-42F8-A53F-ECC5223B8745}" type="datetime1">
               <a:rPr lang="en-GB" smtClean="0"/>
-              <a:t>01/11/2015</a:t>
+              <a:t>15/11/2015</a:t>
             </a:fld>
             <a:endParaRPr lang="en-GB"/>
           </a:p>
@@ -3946,7 +3946,7 @@
           <a:p>
             <a:r>
               <a:rPr lang="it-IT" smtClean="0"/>
-              <a:t>INFDEV016A - G. Costantini, F. Di Giacomo, G. Maggiore</a:t>
+              <a:t>INFDEV026A - G. Costantini, F. Di Giacomo, G. Maggiore</a:t>
             </a:r>
             <a:endParaRPr lang="en-GB"/>
           </a:p>
@@ -4157,9 +4157,9 @@
           <a:bodyPr/>
           <a:lstStyle/>
           <a:p>
-            <a:fld id="{DC4C1ABA-4378-43D1-9984-30041A74F105}" type="datetime1">
+            <a:fld id="{20250C1C-B33B-43A1-AE82-8E9E7DB20D73}" type="datetime1">
               <a:rPr lang="en-GB" smtClean="0"/>
-              <a:t>01/11/2015</a:t>
+              <a:t>15/11/2015</a:t>
             </a:fld>
             <a:endParaRPr lang="en-GB"/>
           </a:p>
@@ -4182,7 +4182,7 @@
           <a:p>
             <a:r>
               <a:rPr lang="it-IT" smtClean="0"/>
-              <a:t>INFDEV016A - G. Costantini, F. Di Giacomo, G. Maggiore</a:t>
+              <a:t>INFDEV026A - G. Costantini, F. Di Giacomo, G. Maggiore</a:t>
             </a:r>
             <a:endParaRPr lang="en-GB"/>
           </a:p>
@@ -4535,9 +4535,9 @@
           <a:bodyPr/>
           <a:lstStyle/>
           <a:p>
-            <a:fld id="{945AF01C-5C4C-4B40-8454-8A9C6E07160E}" type="datetime1">
+            <a:fld id="{58DE2235-6AA8-47F5-9D01-0948564962B0}" type="datetime1">
               <a:rPr lang="en-GB" smtClean="0"/>
-              <a:t>01/11/2015</a:t>
+              <a:t>15/11/2015</a:t>
             </a:fld>
             <a:endParaRPr lang="en-GB"/>
           </a:p>
@@ -4560,7 +4560,7 @@
           <a:p>
             <a:r>
               <a:rPr lang="it-IT" smtClean="0"/>
-              <a:t>INFDEV016A - G. Costantini, F. Di Giacomo, G. Maggiore</a:t>
+              <a:t>INFDEV026A - G. Costantini, F. Di Giacomo, G. Maggiore</a:t>
             </a:r>
             <a:endParaRPr lang="en-GB"/>
           </a:p>
@@ -4662,9 +4662,9 @@
           <a:bodyPr/>
           <a:lstStyle/>
           <a:p>
-            <a:fld id="{EC1B61F9-6382-466F-8A05-8D4FC33A9395}" type="datetime1">
+            <a:fld id="{C2B82BCC-7656-4FB8-8817-2D2523193143}" type="datetime1">
               <a:rPr lang="en-GB" smtClean="0"/>
-              <a:t>01/11/2015</a:t>
+              <a:t>15/11/2015</a:t>
             </a:fld>
             <a:endParaRPr lang="en-GB"/>
           </a:p>
@@ -4687,7 +4687,7 @@
           <a:p>
             <a:r>
               <a:rPr lang="it-IT" smtClean="0"/>
-              <a:t>INFDEV016A - G. Costantini, F. Di Giacomo, G. Maggiore</a:t>
+              <a:t>INFDEV026A - G. Costantini, F. Di Giacomo, G. Maggiore</a:t>
             </a:r>
             <a:endParaRPr lang="en-GB"/>
           </a:p>
@@ -4761,9 +4761,9 @@
           <a:bodyPr/>
           <a:lstStyle/>
           <a:p>
-            <a:fld id="{2DBAF38B-D050-4D4D-AE73-21C7E3B70980}" type="datetime1">
+            <a:fld id="{E9B1E5CC-C158-4334-AC93-866E1D089CE6}" type="datetime1">
               <a:rPr lang="en-GB" smtClean="0"/>
-              <a:t>01/11/2015</a:t>
+              <a:t>15/11/2015</a:t>
             </a:fld>
             <a:endParaRPr lang="en-GB"/>
           </a:p>
@@ -4786,7 +4786,7 @@
           <a:p>
             <a:r>
               <a:rPr lang="it-IT" smtClean="0"/>
-              <a:t>INFDEV016A - G. Costantini, F. Di Giacomo, G. Maggiore</a:t>
+              <a:t>INFDEV026A - G. Costantini, F. Di Giacomo, G. Maggiore</a:t>
             </a:r>
             <a:endParaRPr lang="en-GB"/>
           </a:p>
@@ -5020,9 +5020,9 @@
           <a:bodyPr/>
           <a:lstStyle/>
           <a:p>
-            <a:fld id="{6AE6841C-CBF9-4B36-B3FD-5EDE86858DE3}" type="datetime1">
+            <a:fld id="{1805CE10-4221-45AA-9C81-C847F07AE64E}" type="datetime1">
               <a:rPr lang="en-GB" smtClean="0"/>
-              <a:t>01/11/2015</a:t>
+              <a:t>15/11/2015</a:t>
             </a:fld>
             <a:endParaRPr lang="en-GB"/>
           </a:p>
@@ -5045,7 +5045,7 @@
           <a:p>
             <a:r>
               <a:rPr lang="it-IT" smtClean="0"/>
-              <a:t>INFDEV016A - G. Costantini, F. Di Giacomo, G. Maggiore</a:t>
+              <a:t>INFDEV026A - G. Costantini, F. Di Giacomo, G. Maggiore</a:t>
             </a:r>
             <a:endParaRPr lang="en-GB"/>
           </a:p>
@@ -5287,9 +5287,9 @@
           <a:bodyPr/>
           <a:lstStyle/>
           <a:p>
-            <a:fld id="{00923B39-8117-431D-BDBF-A794DC214773}" type="datetime1">
+            <a:fld id="{9CE42FBE-B2C0-4C85-902B-8B67FAA3BF59}" type="datetime1">
               <a:rPr lang="en-GB" smtClean="0"/>
-              <a:t>01/11/2015</a:t>
+              <a:t>15/11/2015</a:t>
             </a:fld>
             <a:endParaRPr lang="en-GB"/>
           </a:p>
@@ -5312,7 +5312,7 @@
           <a:p>
             <a:r>
               <a:rPr lang="it-IT" smtClean="0"/>
-              <a:t>INFDEV016A - G. Costantini, F. Di Giacomo, G. Maggiore</a:t>
+              <a:t>INFDEV026A - G. Costantini, F. Di Giacomo, G. Maggiore</a:t>
             </a:r>
             <a:endParaRPr lang="en-GB"/>
           </a:p>
@@ -6036,9 +6036,9 @@
             </a:lvl1pPr>
           </a:lstStyle>
           <a:p>
-            <a:fld id="{CFD3F691-C135-4E1A-AC01-A068305B934D}" type="datetime1">
+            <a:fld id="{ED97A32C-9E02-42E1-B012-E07621DB64D9}" type="datetime1">
               <a:rPr lang="en-GB" smtClean="0"/>
-              <a:t>01/11/2015</a:t>
+              <a:t>15/11/2015</a:t>
             </a:fld>
             <a:endParaRPr lang="en-GB"/>
           </a:p>
@@ -6079,7 +6079,7 @@
           <a:p>
             <a:r>
               <a:rPr lang="it-IT" smtClean="0"/>
-              <a:t>INFDEV016A - G. Costantini, F. Di Giacomo, G. Maggiore</a:t>
+              <a:t>INFDEV026A - G. Costantini, F. Di Giacomo, G. Maggiore</a:t>
             </a:r>
             <a:endParaRPr lang="en-GB"/>
           </a:p>
@@ -6610,28 +6610,25 @@
           <a:lstStyle/>
           <a:p>
             <a:r>
+              <a:rPr lang="en-GB" dirty="0" smtClean="0"/>
+              <a:t>INFDEV026A – </a:t>
+            </a:r>
+            <a:r>
+              <a:rPr lang="en-GB" dirty="0" err="1" smtClean="0"/>
+              <a:t>Algoritmiek</a:t>
+            </a:r>
+            <a:r>
               <a:rPr lang="en-GB" dirty="0"/>
-              <a:t>INFDEV016A</a:t>
+              <a:t/>
             </a:r>
             <a:br>
               <a:rPr lang="en-GB" dirty="0"/>
             </a:br>
             <a:r>
-              <a:rPr lang="en-GB" dirty="0"/>
-              <a:t>Development </a:t>
-            </a:r>
-            <a:r>
               <a:rPr lang="en-GB" dirty="0" smtClean="0"/>
-              <a:t>6A - </a:t>
-            </a:r>
-            <a:r>
-              <a:rPr lang="en-GB" dirty="0" err="1" smtClean="0"/>
-              <a:t>Algoritmiek</a:t>
-            </a:r>
-            <a:r>
-              <a:rPr lang="en-GB" dirty="0"/>
-              <a:t> </a:t>
-            </a:r>
+              <a:t>Week 1</a:t>
+            </a:r>
+            <a:endParaRPr lang="en-GB" dirty="0"/>
           </a:p>
         </p:txBody>
       </p:sp>
@@ -6656,7 +6653,6 @@
               <a:rPr lang="en-GB" sz="2000" dirty="0" smtClean="0"/>
               <a:t>G. Costantini, F. Di Giacomo, G. Maggiore</a:t>
             </a:r>
-            <a:endParaRPr lang="en-GB" sz="2000" dirty="0" smtClean="0"/>
           </a:p>
           <a:p>
             <a:r>
@@ -6667,7 +6663,31 @@
             </a:r>
             <a:r>
               <a:rPr lang="en-GB" sz="2000" dirty="0" smtClean="0"/>
-              <a:t> – Office H4.204</a:t>
+              <a:t>, </a:t>
+            </a:r>
+            <a:r>
+              <a:rPr lang="en-GB" sz="2000" dirty="0" smtClean="0">
+                <a:hlinkClick r:id="rId3"/>
+              </a:rPr>
+              <a:t>giacf@hr.nl</a:t>
+            </a:r>
+            <a:r>
+              <a:rPr lang="en-GB" sz="2000" dirty="0" smtClean="0"/>
+              <a:t>, </a:t>
+            </a:r>
+            <a:r>
+              <a:rPr lang="en-GB" sz="2000" dirty="0" smtClean="0">
+                <a:hlinkClick r:id="rId4"/>
+              </a:rPr>
+              <a:t>maggg@hr.nl</a:t>
+            </a:r>
+            <a:r>
+              <a:rPr lang="en-GB" sz="2000" dirty="0" smtClean="0"/>
+              <a:t> </a:t>
+            </a:r>
+            <a:r>
+              <a:rPr lang="en-GB" sz="2000" smtClean="0"/>
+              <a:t>– Office H4.204</a:t>
             </a:r>
             <a:endParaRPr lang="en-GB" sz="2000" dirty="0"/>
           </a:p>
@@ -6733,8 +6753,8 @@
           </a:p>
         </p:txBody>
       </p:sp>
-      <mc:AlternateContent xmlns:mc="http://schemas.openxmlformats.org/markup-compatibility/2006">
-        <mc:Choice xmlns:a14="http://schemas.microsoft.com/office/drawing/2010/main" Requires="a14">
+      <mc:AlternateContent xmlns:mc="http://schemas.openxmlformats.org/markup-compatibility/2006" xmlns:a14="http://schemas.microsoft.com/office/drawing/2010/main">
+        <mc:Choice Requires="a14">
           <p:sp>
             <p:nvSpPr>
               <p:cNvPr id="3" name="Content Placeholder 2"/>
@@ -6754,7 +6774,6 @@
                   <a:rPr lang="en-GB" dirty="0" smtClean="0"/>
                   <a:t>Definition?</a:t>
                 </a:r>
-                <a:endParaRPr lang="en-GB" dirty="0" smtClean="0"/>
               </a:p>
               <a:p>
                 <a:pPr lvl="1"/>
@@ -6859,7 +6878,7 @@
             </p:txBody>
           </p:sp>
         </mc:Choice>
-        <mc:Fallback>
+        <mc:Fallback xmlns="">
           <p:sp>
             <p:nvSpPr>
               <p:cNvPr id="3" name="Content Placeholder 2"/>
@@ -6910,7 +6929,7 @@
           <a:p>
             <a:r>
               <a:rPr lang="it-IT" smtClean="0"/>
-              <a:t>INFDEV016A - G. Costantini, F. Di Giacomo, G. Maggiore</a:t>
+              <a:t>INFDEV026A - G. Costantini, F. Di Giacomo, G. Maggiore</a:t>
             </a:r>
             <a:endParaRPr lang="en-GB"/>
           </a:p>
@@ -8737,15 +8756,7 @@
             </a:br>
             <a:r>
               <a:rPr lang="en-GB" dirty="0" smtClean="0"/>
-              <a:t>tightness of representation (no additional data </a:t>
-            </a:r>
-            <a:r>
-              <a:rPr lang="en-GB" dirty="0" smtClean="0"/>
-              <a:t>besides content</a:t>
-            </a:r>
-            <a:r>
-              <a:rPr lang="en-GB" dirty="0" smtClean="0"/>
-              <a:t>)</a:t>
+              <a:t>tightness of representation (no additional data besides content)</a:t>
             </a:r>
           </a:p>
           <a:p>
@@ -8782,7 +8793,7 @@
           <a:p>
             <a:r>
               <a:rPr lang="it-IT" smtClean="0"/>
-              <a:t>INFDEV016A - G. Costantini, F. Di Giacomo, G. Maggiore</a:t>
+              <a:t>INFDEV026A - G. Costantini, F. Di Giacomo, G. Maggiore</a:t>
             </a:r>
             <a:endParaRPr lang="en-GB"/>
           </a:p>
@@ -8893,8 +8904,8 @@
           </a:p>
         </p:txBody>
       </p:sp>
-      <mc:AlternateContent xmlns:mc="http://schemas.openxmlformats.org/markup-compatibility/2006">
-        <mc:Choice xmlns:a14="http://schemas.microsoft.com/office/drawing/2010/main" Requires="a14">
+      <mc:AlternateContent xmlns:mc="http://schemas.openxmlformats.org/markup-compatibility/2006" xmlns:a14="http://schemas.microsoft.com/office/drawing/2010/main">
+        <mc:Choice Requires="a14">
           <p:sp>
             <p:nvSpPr>
               <p:cNvPr id="3" name="Content Placeholder 2"/>
@@ -8923,11 +8934,7 @@
                 </a:r>
                 <a:r>
                   <a:rPr lang="en-US" dirty="0" smtClean="0"/>
-                  <a:t> </a:t>
-                </a:r>
-                <a:r>
-                  <a:rPr lang="en-US" dirty="0" smtClean="0"/>
-                  <a:t>do you know what it is</a:t>
+                  <a:t> do you know what it is</a:t>
                 </a:r>
                 <a:r>
                   <a:rPr lang="en-US" b="1" dirty="0" smtClean="0"/>
@@ -9122,7 +9129,7 @@
             </p:txBody>
           </p:sp>
         </mc:Choice>
-        <mc:Fallback>
+        <mc:Fallback xmlns="">
           <p:sp>
             <p:nvSpPr>
               <p:cNvPr id="3" name="Content Placeholder 2"/>
@@ -9177,7 +9184,7 @@
           <a:p>
             <a:r>
               <a:rPr lang="it-IT" smtClean="0"/>
-              <a:t>INFDEV016A - G. Costantini, F. Di Giacomo, G. Maggiore</a:t>
+              <a:t>INFDEV026A - G. Costantini, F. Di Giacomo, G. Maggiore</a:t>
             </a:r>
             <a:endParaRPr lang="en-GB"/>
           </a:p>
@@ -9602,8 +9609,8 @@
           </a:p>
         </p:txBody>
       </p:sp>
-      <mc:AlternateContent xmlns:mc="http://schemas.openxmlformats.org/markup-compatibility/2006">
-        <mc:Choice xmlns:a14="http://schemas.microsoft.com/office/drawing/2010/main" Requires="a14">
+      <mc:AlternateContent xmlns:mc="http://schemas.openxmlformats.org/markup-compatibility/2006" xmlns:a14="http://schemas.microsoft.com/office/drawing/2010/main">
+        <mc:Choice Requires="a14">
           <p:sp>
             <p:nvSpPr>
               <p:cNvPr id="3" name="Content Placeholder 2"/>
@@ -9626,13 +9633,8 @@
               <a:p>
                 <a:r>
                   <a:rPr lang="en-GB" dirty="0" smtClean="0"/>
-                  <a:t>Components / </a:t>
-                </a:r>
-                <a:r>
-                  <a:rPr lang="en-GB" dirty="0" smtClean="0"/>
-                  <a:t>Elements?</a:t>
-                </a:r>
-                <a:endParaRPr lang="en-GB" dirty="0" smtClean="0"/>
+                  <a:t>Components / Elements?</a:t>
+                </a:r>
               </a:p>
               <a:p>
                 <a:pPr lvl="1"/>
@@ -9644,13 +9646,8 @@
               <a:p>
                 <a:r>
                   <a:rPr lang="en-GB" dirty="0" smtClean="0"/>
-                  <a:t>Length (</a:t>
-                </a:r>
-                <a:r>
-                  <a:rPr lang="en-GB" dirty="0" smtClean="0"/>
-                  <a:t>fixed)?</a:t>
-                </a:r>
-                <a:endParaRPr lang="en-GB" dirty="0" smtClean="0"/>
+                  <a:t>Length (fixed)?</a:t>
+                </a:r>
               </a:p>
               <a:p>
                 <a:pPr lvl="1"/>
@@ -9662,13 +9659,8 @@
               <a:p>
                 <a:r>
                   <a:rPr lang="en-GB" dirty="0" smtClean="0"/>
-                  <a:t>Bounds </a:t>
-                </a:r>
-                <a:r>
-                  <a:rPr lang="en-GB" dirty="0" smtClean="0"/>
-                  <a:t>checking?</a:t>
-                </a:r>
-                <a:endParaRPr lang="en-GB" dirty="0" smtClean="0"/>
+                  <a:t>Bounds checking?</a:t>
+                </a:r>
               </a:p>
               <a:p>
                 <a:pPr lvl="1"/>
@@ -9711,7 +9703,6 @@
                   <a:rPr lang="en-GB" dirty="0" smtClean="0"/>
                   <a:t>Origin?</a:t>
                 </a:r>
-                <a:endParaRPr lang="en-GB" dirty="0" smtClean="0"/>
               </a:p>
               <a:p>
                 <a:pPr lvl="1"/>
@@ -9723,7 +9714,7 @@
             </p:txBody>
           </p:sp>
         </mc:Choice>
-        <mc:Fallback>
+        <mc:Fallback xmlns="">
           <p:sp>
             <p:nvSpPr>
               <p:cNvPr id="3" name="Content Placeholder 2"/>
@@ -9778,7 +9769,7 @@
           <a:p>
             <a:r>
               <a:rPr lang="it-IT" smtClean="0"/>
-              <a:t>INFDEV016A - G. Costantini, F. Di Giacomo, G. Maggiore</a:t>
+              <a:t>INFDEV026A - G. Costantini, F. Di Giacomo, G. Maggiore</a:t>
             </a:r>
             <a:endParaRPr lang="en-GB" dirty="0"/>
           </a:p>
@@ -10158,7 +10149,7 @@
           <a:p>
             <a:r>
               <a:rPr lang="it-IT" smtClean="0"/>
-              <a:t>INFDEV016A - G. Costantini, F. Di Giacomo, G. Maggiore</a:t>
+              <a:t>INFDEV026A - G. Costantini, F. Di Giacomo, G. Maggiore</a:t>
             </a:r>
             <a:endParaRPr lang="en-GB"/>
           </a:p>
@@ -10259,11 +10250,7 @@
             </a:r>
             <a:r>
               <a:rPr lang="en-GB" dirty="0" smtClean="0"/>
-              <a:t> </a:t>
-            </a:r>
-            <a:r>
-              <a:rPr lang="en-GB" dirty="0" smtClean="0"/>
-              <a:t>in the array </a:t>
+              <a:t> in the array </a:t>
             </a:r>
             <a:r>
               <a:rPr lang="en-GB" dirty="0">
@@ -10333,14 +10320,7 @@
                 <a:latin typeface="Consolas" panose="020B0609020204030204" pitchFamily="49" charset="0"/>
                 <a:cs typeface="Consolas" panose="020B0609020204030204" pitchFamily="49" charset="0"/>
               </a:rPr>
-              <a:t> = 0 TO </a:t>
-            </a:r>
-            <a:r>
-              <a:rPr lang="en-GB" dirty="0" smtClean="0">
-                <a:latin typeface="Consolas" panose="020B0609020204030204" pitchFamily="49" charset="0"/>
-                <a:cs typeface="Consolas" panose="020B0609020204030204" pitchFamily="49" charset="0"/>
-              </a:rPr>
-              <a:t>N-1</a:t>
+              <a:t> = 0 TO N-1</a:t>
             </a:r>
           </a:p>
           <a:p>
@@ -10359,21 +10339,7 @@
                 <a:latin typeface="Consolas" panose="020B0609020204030204" pitchFamily="49" charset="0"/>
                 <a:cs typeface="Consolas" panose="020B0609020204030204" pitchFamily="49" charset="0"/>
               </a:rPr>
-              <a:t> </a:t>
-            </a:r>
-            <a:r>
-              <a:rPr lang="en-GB" sz="1800" dirty="0" smtClean="0">
-                <a:latin typeface="Consolas" panose="020B0609020204030204" pitchFamily="49" charset="0"/>
-                <a:cs typeface="Consolas" panose="020B0609020204030204" pitchFamily="49" charset="0"/>
-              </a:rPr>
-              <a:t>IF </a:t>
-            </a:r>
-            <a:r>
-              <a:rPr lang="en-GB" sz="1800" dirty="0" smtClean="0">
-                <a:latin typeface="Consolas" panose="020B0609020204030204" pitchFamily="49" charset="0"/>
-                <a:cs typeface="Consolas" panose="020B0609020204030204" pitchFamily="49" charset="0"/>
-              </a:rPr>
-              <a:t>a[</a:t>
+              <a:t> IF a[</a:t>
             </a:r>
             <a:r>
               <a:rPr lang="en-GB" sz="1800" dirty="0" err="1" smtClean="0">
@@ -10387,14 +10353,7 @@
                 <a:latin typeface="Consolas" panose="020B0609020204030204" pitchFamily="49" charset="0"/>
                 <a:cs typeface="Consolas" panose="020B0609020204030204" pitchFamily="49" charset="0"/>
               </a:rPr>
-              <a:t>] = </a:t>
-            </a:r>
-            <a:r>
-              <a:rPr lang="en-GB" sz="1800" dirty="0" smtClean="0">
-                <a:latin typeface="Consolas" panose="020B0609020204030204" pitchFamily="49" charset="0"/>
-                <a:cs typeface="Consolas" panose="020B0609020204030204" pitchFamily="49" charset="0"/>
-              </a:rPr>
-              <a:t>v</a:t>
+              <a:t>] = v</a:t>
             </a:r>
           </a:p>
           <a:p>
@@ -10469,7 +10428,7 @@
           <a:p>
             <a:r>
               <a:rPr lang="it-IT" smtClean="0"/>
-              <a:t>INFDEV016A - G. Costantini, F. Di Giacomo, G. Maggiore</a:t>
+              <a:t>INFDEV026A - G. Costantini, F. Di Giacomo, G. Maggiore</a:t>
             </a:r>
             <a:endParaRPr lang="en-GB"/>
           </a:p>
@@ -10543,8 +10502,8 @@
           </a:p>
         </p:txBody>
       </p:sp>
-      <mc:AlternateContent xmlns:mc="http://schemas.openxmlformats.org/markup-compatibility/2006">
-        <mc:Choice xmlns:a14="http://schemas.microsoft.com/office/drawing/2010/main" Requires="a14">
+      <mc:AlternateContent xmlns:mc="http://schemas.openxmlformats.org/markup-compatibility/2006" xmlns:a14="http://schemas.microsoft.com/office/drawing/2010/main">
+        <mc:Choice Requires="a14">
           <p:sp>
             <p:nvSpPr>
               <p:cNvPr id="3" name="Content Placeholder 2"/>
@@ -10732,7 +10691,7 @@
             </p:txBody>
           </p:sp>
         </mc:Choice>
-        <mc:Fallback>
+        <mc:Fallback xmlns="">
           <p:sp>
             <p:nvSpPr>
               <p:cNvPr id="3" name="Content Placeholder 2"/>
@@ -10787,7 +10746,7 @@
           <a:p>
             <a:r>
               <a:rPr lang="it-IT" smtClean="0"/>
-              <a:t>INFDEV016A - G. Costantini, F. Di Giacomo, G. Maggiore</a:t>
+              <a:t>INFDEV026A - G. Costantini, F. Di Giacomo, G. Maggiore</a:t>
             </a:r>
             <a:endParaRPr lang="en-GB"/>
           </a:p>
@@ -10852,14 +10811,7 @@
                 <a:latin typeface="Consolas" panose="020B0609020204030204" pitchFamily="49" charset="0"/>
                 <a:cs typeface="Consolas" panose="020B0609020204030204" pitchFamily="49" charset="0"/>
               </a:rPr>
-              <a:t> = 0 TO </a:t>
-            </a:r>
-            <a:r>
-              <a:rPr lang="en-GB" sz="2000" dirty="0" smtClean="0">
-                <a:latin typeface="Consolas" panose="020B0609020204030204" pitchFamily="49" charset="0"/>
-                <a:cs typeface="Consolas" panose="020B0609020204030204" pitchFamily="49" charset="0"/>
-              </a:rPr>
-              <a:t>N-1</a:t>
+              <a:t> = 0 TO N-1</a:t>
             </a:r>
           </a:p>
           <a:p>
@@ -10875,14 +10827,7 @@
                 <a:latin typeface="Consolas" panose="020B0609020204030204" pitchFamily="49" charset="0"/>
                 <a:cs typeface="Consolas" panose="020B0609020204030204" pitchFamily="49" charset="0"/>
               </a:rPr>
-              <a:t> </a:t>
-            </a:r>
-            <a:r>
-              <a:rPr lang="en-GB" sz="2000" dirty="0" smtClean="0">
-                <a:latin typeface="Consolas" panose="020B0609020204030204" pitchFamily="49" charset="0"/>
-                <a:cs typeface="Consolas" panose="020B0609020204030204" pitchFamily="49" charset="0"/>
-              </a:rPr>
-              <a:t>IF </a:t>
+              <a:t> IF </a:t>
             </a:r>
             <a:r>
               <a:rPr lang="en-GB" sz="2000" dirty="0">
@@ -10926,14 +10871,7 @@
                 <a:latin typeface="Consolas" panose="020B0609020204030204" pitchFamily="49" charset="0"/>
                 <a:cs typeface="Consolas" panose="020B0609020204030204" pitchFamily="49" charset="0"/>
               </a:rPr>
-              <a:t>   </a:t>
-            </a:r>
-            <a:r>
-              <a:rPr lang="en-GB" sz="2000" dirty="0" smtClean="0">
-                <a:latin typeface="Consolas" panose="020B0609020204030204" pitchFamily="49" charset="0"/>
-                <a:cs typeface="Consolas" panose="020B0609020204030204" pitchFamily="49" charset="0"/>
-              </a:rPr>
-              <a:t>RETURN </a:t>
+              <a:t>   RETURN </a:t>
             </a:r>
             <a:r>
               <a:rPr lang="en-GB" sz="2000" dirty="0" err="1">
@@ -11355,7 +11293,7 @@
           <a:p>
             <a:r>
               <a:rPr lang="it-IT" smtClean="0"/>
-              <a:t>INFDEV016A - G. Costantini, F. Di Giacomo, G. Maggiore</a:t>
+              <a:t>INFDEV026A - G. Costantini, F. Di Giacomo, G. Maggiore</a:t>
             </a:r>
             <a:endParaRPr lang="en-GB"/>
           </a:p>
@@ -11420,14 +11358,7 @@
                 <a:latin typeface="Consolas" panose="020B0609020204030204" pitchFamily="49" charset="0"/>
                 <a:cs typeface="Consolas" panose="020B0609020204030204" pitchFamily="49" charset="0"/>
               </a:rPr>
-              <a:t> = 0 TO </a:t>
-            </a:r>
-            <a:r>
-              <a:rPr lang="en-GB" sz="2000" dirty="0" smtClean="0">
-                <a:latin typeface="Consolas" panose="020B0609020204030204" pitchFamily="49" charset="0"/>
-                <a:cs typeface="Consolas" panose="020B0609020204030204" pitchFamily="49" charset="0"/>
-              </a:rPr>
-              <a:t>N-1</a:t>
+              <a:t> = 0 TO N-1</a:t>
             </a:r>
           </a:p>
           <a:p>
@@ -11443,14 +11374,7 @@
                 <a:latin typeface="Consolas" panose="020B0609020204030204" pitchFamily="49" charset="0"/>
                 <a:cs typeface="Consolas" panose="020B0609020204030204" pitchFamily="49" charset="0"/>
               </a:rPr>
-              <a:t> </a:t>
-            </a:r>
-            <a:r>
-              <a:rPr lang="en-GB" sz="2000" dirty="0" smtClean="0">
-                <a:latin typeface="Consolas" panose="020B0609020204030204" pitchFamily="49" charset="0"/>
-                <a:cs typeface="Consolas" panose="020B0609020204030204" pitchFamily="49" charset="0"/>
-              </a:rPr>
-              <a:t>IF </a:t>
+              <a:t> IF </a:t>
             </a:r>
             <a:r>
               <a:rPr lang="en-GB" sz="2000" dirty="0">
@@ -11494,14 +11418,7 @@
                 <a:latin typeface="Consolas" panose="020B0609020204030204" pitchFamily="49" charset="0"/>
                 <a:cs typeface="Consolas" panose="020B0609020204030204" pitchFamily="49" charset="0"/>
               </a:rPr>
-              <a:t>   </a:t>
-            </a:r>
-            <a:r>
-              <a:rPr lang="en-GB" sz="2000" dirty="0" smtClean="0">
-                <a:latin typeface="Consolas" panose="020B0609020204030204" pitchFamily="49" charset="0"/>
-                <a:cs typeface="Consolas" panose="020B0609020204030204" pitchFamily="49" charset="0"/>
-              </a:rPr>
-              <a:t>RETURN </a:t>
+              <a:t>   RETURN </a:t>
             </a:r>
             <a:r>
               <a:rPr lang="en-GB" sz="2000" dirty="0" err="1">
@@ -11643,15 +11560,7 @@
           <a:p>
             <a:r>
               <a:rPr lang="en-GB" dirty="0" smtClean="0"/>
-              <a:t>Basic </a:t>
-            </a:r>
-            <a:r>
-              <a:rPr lang="en-GB" dirty="0" smtClean="0"/>
-              <a:t>idea: </a:t>
-            </a:r>
-            <a:r>
-              <a:rPr lang="en-GB" dirty="0" smtClean="0"/>
-              <a:t>divide the sequence in two and focus on the half which could contain the element</a:t>
+              <a:t>Basic idea: divide the sequence in two and focus on the half which could contain the element</a:t>
             </a:r>
           </a:p>
           <a:p>
@@ -11684,7 +11593,7 @@
           <a:p>
             <a:r>
               <a:rPr lang="it-IT" smtClean="0"/>
-              <a:t>INFDEV016A - G. Costantini, F. Di Giacomo, G. Maggiore</a:t>
+              <a:t>INFDEV026A - G. Costantini, F. Di Giacomo, G. Maggiore</a:t>
             </a:r>
             <a:endParaRPr lang="en-GB"/>
           </a:p>
@@ -11899,59 +11808,31 @@
                 <a:latin typeface="Consolas" panose="020B0609020204030204" pitchFamily="49" charset="0"/>
                 <a:cs typeface="Consolas" panose="020B0609020204030204" pitchFamily="49" charset="0"/>
               </a:rPr>
-              <a:t> </a:t>
-            </a:r>
+              <a:t> middle = (low + high) / 2</a:t>
+            </a:r>
+          </a:p>
+          <a:p>
+            <a:pPr marL="0" indent="0">
+              <a:buNone/>
+            </a:pPr>
             <a:r>
               <a:rPr lang="en-GB" sz="1900" dirty="0" smtClean="0">
                 <a:latin typeface="Consolas" panose="020B0609020204030204" pitchFamily="49" charset="0"/>
                 <a:cs typeface="Consolas" panose="020B0609020204030204" pitchFamily="49" charset="0"/>
               </a:rPr>
-              <a:t>middle </a:t>
-            </a:r>
+              <a:t>  IF a[middle] &gt; v</a:t>
+            </a:r>
+          </a:p>
+          <a:p>
+            <a:pPr marL="0" indent="0">
+              <a:buNone/>
+            </a:pPr>
             <a:r>
               <a:rPr lang="en-GB" sz="1900" dirty="0" smtClean="0">
                 <a:latin typeface="Consolas" panose="020B0609020204030204" pitchFamily="49" charset="0"/>
                 <a:cs typeface="Consolas" panose="020B0609020204030204" pitchFamily="49" charset="0"/>
               </a:rPr>
-              <a:t>= (low + high) / 2</a:t>
-            </a:r>
-          </a:p>
-          <a:p>
-            <a:pPr marL="0" indent="0">
-              <a:buNone/>
-            </a:pPr>
-            <a:r>
-              <a:rPr lang="en-GB" sz="1900" dirty="0" smtClean="0">
-                <a:latin typeface="Consolas" panose="020B0609020204030204" pitchFamily="49" charset="0"/>
-                <a:cs typeface="Consolas" panose="020B0609020204030204" pitchFamily="49" charset="0"/>
-              </a:rPr>
-              <a:t>  IF </a:t>
-            </a:r>
-            <a:r>
-              <a:rPr lang="en-GB" sz="1900" dirty="0" smtClean="0">
-                <a:latin typeface="Consolas" panose="020B0609020204030204" pitchFamily="49" charset="0"/>
-                <a:cs typeface="Consolas" panose="020B0609020204030204" pitchFamily="49" charset="0"/>
-              </a:rPr>
-              <a:t>a[middle] &gt; v</a:t>
-            </a:r>
-          </a:p>
-          <a:p>
-            <a:pPr marL="0" indent="0">
-              <a:buNone/>
-            </a:pPr>
-            <a:r>
-              <a:rPr lang="en-GB" sz="1900" dirty="0" smtClean="0">
-                <a:latin typeface="Consolas" panose="020B0609020204030204" pitchFamily="49" charset="0"/>
-                <a:cs typeface="Consolas" panose="020B0609020204030204" pitchFamily="49" charset="0"/>
-              </a:rPr>
-              <a:t>    high </a:t>
-            </a:r>
-            <a:r>
-              <a:rPr lang="en-GB" sz="1900" dirty="0" smtClean="0">
-                <a:latin typeface="Consolas" panose="020B0609020204030204" pitchFamily="49" charset="0"/>
-                <a:cs typeface="Consolas" panose="020B0609020204030204" pitchFamily="49" charset="0"/>
-              </a:rPr>
-              <a:t>= middle – 1</a:t>
+              <a:t>    high = middle – 1</a:t>
             </a:r>
           </a:p>
           <a:p>
@@ -11989,14 +11870,7 @@
                 <a:latin typeface="Consolas" panose="020B0609020204030204" pitchFamily="49" charset="0"/>
                 <a:cs typeface="Consolas" panose="020B0609020204030204" pitchFamily="49" charset="0"/>
               </a:rPr>
-              <a:t>    low </a:t>
-            </a:r>
-            <a:r>
-              <a:rPr lang="en-GB" sz="1900" dirty="0" smtClean="0">
-                <a:latin typeface="Consolas" panose="020B0609020204030204" pitchFamily="49" charset="0"/>
-                <a:cs typeface="Consolas" panose="020B0609020204030204" pitchFamily="49" charset="0"/>
-              </a:rPr>
-              <a:t>= middle + 1</a:t>
+              <a:t>    low = middle + 1</a:t>
             </a:r>
           </a:p>
           <a:p>
@@ -12010,10 +11884,6 @@
               </a:rPr>
               <a:t>  ELSE </a:t>
             </a:r>
-            <a:endParaRPr lang="en-GB" sz="1900" dirty="0" smtClean="0">
-              <a:latin typeface="Consolas" panose="020B0609020204030204" pitchFamily="49" charset="0"/>
-              <a:cs typeface="Consolas" panose="020B0609020204030204" pitchFamily="49" charset="0"/>
-            </a:endParaRPr>
           </a:p>
           <a:p>
             <a:pPr marL="0" indent="0">
@@ -12024,14 +11894,7 @@
                 <a:latin typeface="Consolas" panose="020B0609020204030204" pitchFamily="49" charset="0"/>
                 <a:cs typeface="Consolas" panose="020B0609020204030204" pitchFamily="49" charset="0"/>
               </a:rPr>
-              <a:t>    RETURN </a:t>
-            </a:r>
-            <a:r>
-              <a:rPr lang="en-GB" sz="1900" dirty="0" smtClean="0">
-                <a:latin typeface="Consolas" panose="020B0609020204030204" pitchFamily="49" charset="0"/>
-                <a:cs typeface="Consolas" panose="020B0609020204030204" pitchFamily="49" charset="0"/>
-              </a:rPr>
-              <a:t>middle</a:t>
+              <a:t>    RETURN middle</a:t>
             </a:r>
             <a:endParaRPr lang="en-GB" sz="1900" dirty="0">
               <a:latin typeface="Consolas" panose="020B0609020204030204" pitchFamily="49" charset="0"/>
@@ -12087,7 +11950,7 @@
           <a:p>
             <a:r>
               <a:rPr lang="it-IT" smtClean="0"/>
-              <a:t>INFDEV016A - G. Costantini, F. Di Giacomo, G. Maggiore</a:t>
+              <a:t>INFDEV026A - G. Costantini, F. Di Giacomo, G. Maggiore</a:t>
             </a:r>
             <a:endParaRPr lang="en-GB"/>
           </a:p>
@@ -12368,13 +12231,8 @@
             <a:pPr lvl="1"/>
             <a:r>
               <a:rPr lang="en-GB" dirty="0" smtClean="0"/>
-              <a:t>C#, F</a:t>
-            </a:r>
-            <a:r>
-              <a:rPr lang="en-GB" dirty="0" smtClean="0"/>
-              <a:t>#</a:t>
-            </a:r>
-            <a:endParaRPr lang="en-GB" dirty="0" smtClean="0"/>
+              <a:t>C#, F#</a:t>
+            </a:r>
           </a:p>
           <a:p>
             <a:pPr lvl="1"/>
@@ -12405,8 +12263,8 @@
           <a:lstStyle/>
           <a:p>
             <a:r>
-              <a:rPr lang="it-IT" dirty="0" smtClean="0"/>
-              <a:t>INFDEV016A - G. Costantini, F. Di Giacomo, G. Maggiore</a:t>
+              <a:rPr lang="it-IT" smtClean="0"/>
+              <a:t>INFDEV026A - G. Costantini, F. Di Giacomo, G. Maggiore</a:t>
             </a:r>
             <a:endParaRPr lang="en-GB" dirty="0"/>
           </a:p>
@@ -12621,59 +12479,31 @@
                 <a:latin typeface="Consolas" panose="020B0609020204030204" pitchFamily="49" charset="0"/>
                 <a:cs typeface="Consolas" panose="020B0609020204030204" pitchFamily="49" charset="0"/>
               </a:rPr>
-              <a:t> </a:t>
-            </a:r>
+              <a:t> middle = (low + high) / 2</a:t>
+            </a:r>
+          </a:p>
+          <a:p>
+            <a:pPr marL="0" indent="0">
+              <a:buNone/>
+            </a:pPr>
             <a:r>
               <a:rPr lang="en-GB" sz="1900" dirty="0" smtClean="0">
                 <a:latin typeface="Consolas" panose="020B0609020204030204" pitchFamily="49" charset="0"/>
                 <a:cs typeface="Consolas" panose="020B0609020204030204" pitchFamily="49" charset="0"/>
               </a:rPr>
-              <a:t>middle </a:t>
-            </a:r>
+              <a:t>  IF a[middle] &gt; v</a:t>
+            </a:r>
+          </a:p>
+          <a:p>
+            <a:pPr marL="0" indent="0">
+              <a:buNone/>
+            </a:pPr>
             <a:r>
               <a:rPr lang="en-GB" sz="1900" dirty="0" smtClean="0">
                 <a:latin typeface="Consolas" panose="020B0609020204030204" pitchFamily="49" charset="0"/>
                 <a:cs typeface="Consolas" panose="020B0609020204030204" pitchFamily="49" charset="0"/>
               </a:rPr>
-              <a:t>= (low + high) / 2</a:t>
-            </a:r>
-          </a:p>
-          <a:p>
-            <a:pPr marL="0" indent="0">
-              <a:buNone/>
-            </a:pPr>
-            <a:r>
-              <a:rPr lang="en-GB" sz="1900" dirty="0" smtClean="0">
-                <a:latin typeface="Consolas" panose="020B0609020204030204" pitchFamily="49" charset="0"/>
-                <a:cs typeface="Consolas" panose="020B0609020204030204" pitchFamily="49" charset="0"/>
-              </a:rPr>
-              <a:t>  IF </a:t>
-            </a:r>
-            <a:r>
-              <a:rPr lang="en-GB" sz="1900" dirty="0" smtClean="0">
-                <a:latin typeface="Consolas" panose="020B0609020204030204" pitchFamily="49" charset="0"/>
-                <a:cs typeface="Consolas" panose="020B0609020204030204" pitchFamily="49" charset="0"/>
-              </a:rPr>
-              <a:t>a[middle] &gt; v</a:t>
-            </a:r>
-          </a:p>
-          <a:p>
-            <a:pPr marL="0" indent="0">
-              <a:buNone/>
-            </a:pPr>
-            <a:r>
-              <a:rPr lang="en-GB" sz="1900" dirty="0" smtClean="0">
-                <a:latin typeface="Consolas" panose="020B0609020204030204" pitchFamily="49" charset="0"/>
-                <a:cs typeface="Consolas" panose="020B0609020204030204" pitchFamily="49" charset="0"/>
-              </a:rPr>
-              <a:t>    high </a:t>
-            </a:r>
-            <a:r>
-              <a:rPr lang="en-GB" sz="1900" dirty="0" smtClean="0">
-                <a:latin typeface="Consolas" panose="020B0609020204030204" pitchFamily="49" charset="0"/>
-                <a:cs typeface="Consolas" panose="020B0609020204030204" pitchFamily="49" charset="0"/>
-              </a:rPr>
-              <a:t>= middle – 1</a:t>
+              <a:t>    high = middle – 1</a:t>
             </a:r>
           </a:p>
           <a:p>
@@ -12711,14 +12541,7 @@
                 <a:latin typeface="Consolas" panose="020B0609020204030204" pitchFamily="49" charset="0"/>
                 <a:cs typeface="Consolas" panose="020B0609020204030204" pitchFamily="49" charset="0"/>
               </a:rPr>
-              <a:t>    low </a:t>
-            </a:r>
-            <a:r>
-              <a:rPr lang="en-GB" sz="1900" dirty="0" smtClean="0">
-                <a:latin typeface="Consolas" panose="020B0609020204030204" pitchFamily="49" charset="0"/>
-                <a:cs typeface="Consolas" panose="020B0609020204030204" pitchFamily="49" charset="0"/>
-              </a:rPr>
-              <a:t>= middle + 1</a:t>
+              <a:t>    low = middle + 1</a:t>
             </a:r>
           </a:p>
           <a:p>
@@ -12732,10 +12555,6 @@
               </a:rPr>
               <a:t>  ELSE </a:t>
             </a:r>
-            <a:endParaRPr lang="en-GB" sz="1900" dirty="0" smtClean="0">
-              <a:latin typeface="Consolas" panose="020B0609020204030204" pitchFamily="49" charset="0"/>
-              <a:cs typeface="Consolas" panose="020B0609020204030204" pitchFamily="49" charset="0"/>
-            </a:endParaRPr>
           </a:p>
           <a:p>
             <a:pPr marL="0" indent="0">
@@ -12746,14 +12565,7 @@
                 <a:latin typeface="Consolas" panose="020B0609020204030204" pitchFamily="49" charset="0"/>
                 <a:cs typeface="Consolas" panose="020B0609020204030204" pitchFamily="49" charset="0"/>
               </a:rPr>
-              <a:t>    RETURN </a:t>
-            </a:r>
-            <a:r>
-              <a:rPr lang="en-GB" sz="1900" dirty="0" smtClean="0">
-                <a:latin typeface="Consolas" panose="020B0609020204030204" pitchFamily="49" charset="0"/>
-                <a:cs typeface="Consolas" panose="020B0609020204030204" pitchFamily="49" charset="0"/>
-              </a:rPr>
-              <a:t>middle</a:t>
+              <a:t>    RETURN middle</a:t>
             </a:r>
             <a:endParaRPr lang="en-GB" sz="1900" dirty="0">
               <a:latin typeface="Consolas" panose="020B0609020204030204" pitchFamily="49" charset="0"/>
@@ -12809,7 +12621,7 @@
           <a:p>
             <a:r>
               <a:rPr lang="it-IT" smtClean="0"/>
-              <a:t>INFDEV016A - G. Costantini, F. Di Giacomo, G. Maggiore</a:t>
+              <a:t>INFDEV026A - G. Costantini, F. Di Giacomo, G. Maggiore</a:t>
             </a:r>
             <a:endParaRPr lang="en-GB"/>
           </a:p>
@@ -13269,59 +13081,31 @@
                 <a:latin typeface="Consolas" panose="020B0609020204030204" pitchFamily="49" charset="0"/>
                 <a:cs typeface="Consolas" panose="020B0609020204030204" pitchFamily="49" charset="0"/>
               </a:rPr>
-              <a:t> </a:t>
-            </a:r>
+              <a:t> middle = (low + high) / 2</a:t>
+            </a:r>
+          </a:p>
+          <a:p>
+            <a:pPr marL="0" indent="0">
+              <a:buNone/>
+            </a:pPr>
             <a:r>
               <a:rPr lang="en-GB" sz="1900" dirty="0" smtClean="0">
                 <a:latin typeface="Consolas" panose="020B0609020204030204" pitchFamily="49" charset="0"/>
                 <a:cs typeface="Consolas" panose="020B0609020204030204" pitchFamily="49" charset="0"/>
               </a:rPr>
-              <a:t>middle </a:t>
-            </a:r>
+              <a:t>  IF a[middle] &gt; v</a:t>
+            </a:r>
+          </a:p>
+          <a:p>
+            <a:pPr marL="0" indent="0">
+              <a:buNone/>
+            </a:pPr>
             <a:r>
               <a:rPr lang="en-GB" sz="1900" dirty="0" smtClean="0">
                 <a:latin typeface="Consolas" panose="020B0609020204030204" pitchFamily="49" charset="0"/>
                 <a:cs typeface="Consolas" panose="020B0609020204030204" pitchFamily="49" charset="0"/>
               </a:rPr>
-              <a:t>= (low + high) / 2</a:t>
-            </a:r>
-          </a:p>
-          <a:p>
-            <a:pPr marL="0" indent="0">
-              <a:buNone/>
-            </a:pPr>
-            <a:r>
-              <a:rPr lang="en-GB" sz="1900" dirty="0" smtClean="0">
-                <a:latin typeface="Consolas" panose="020B0609020204030204" pitchFamily="49" charset="0"/>
-                <a:cs typeface="Consolas" panose="020B0609020204030204" pitchFamily="49" charset="0"/>
-              </a:rPr>
-              <a:t>  IF </a:t>
-            </a:r>
-            <a:r>
-              <a:rPr lang="en-GB" sz="1900" dirty="0" smtClean="0">
-                <a:latin typeface="Consolas" panose="020B0609020204030204" pitchFamily="49" charset="0"/>
-                <a:cs typeface="Consolas" panose="020B0609020204030204" pitchFamily="49" charset="0"/>
-              </a:rPr>
-              <a:t>a[middle] &gt; v</a:t>
-            </a:r>
-          </a:p>
-          <a:p>
-            <a:pPr marL="0" indent="0">
-              <a:buNone/>
-            </a:pPr>
-            <a:r>
-              <a:rPr lang="en-GB" sz="1900" dirty="0" smtClean="0">
-                <a:latin typeface="Consolas" panose="020B0609020204030204" pitchFamily="49" charset="0"/>
-                <a:cs typeface="Consolas" panose="020B0609020204030204" pitchFamily="49" charset="0"/>
-              </a:rPr>
-              <a:t>    high </a:t>
-            </a:r>
-            <a:r>
-              <a:rPr lang="en-GB" sz="1900" dirty="0" smtClean="0">
-                <a:latin typeface="Consolas" panose="020B0609020204030204" pitchFamily="49" charset="0"/>
-                <a:cs typeface="Consolas" panose="020B0609020204030204" pitchFamily="49" charset="0"/>
-              </a:rPr>
-              <a:t>= middle – 1</a:t>
+              <a:t>    high = middle – 1</a:t>
             </a:r>
           </a:p>
           <a:p>
@@ -13359,14 +13143,7 @@
                 <a:latin typeface="Consolas" panose="020B0609020204030204" pitchFamily="49" charset="0"/>
                 <a:cs typeface="Consolas" panose="020B0609020204030204" pitchFamily="49" charset="0"/>
               </a:rPr>
-              <a:t>    low </a:t>
-            </a:r>
-            <a:r>
-              <a:rPr lang="en-GB" sz="1900" dirty="0" smtClean="0">
-                <a:latin typeface="Consolas" panose="020B0609020204030204" pitchFamily="49" charset="0"/>
-                <a:cs typeface="Consolas" panose="020B0609020204030204" pitchFamily="49" charset="0"/>
-              </a:rPr>
-              <a:t>= middle + 1</a:t>
+              <a:t>    low = middle + 1</a:t>
             </a:r>
           </a:p>
           <a:p>
@@ -13380,10 +13157,6 @@
               </a:rPr>
               <a:t>  ELSE </a:t>
             </a:r>
-            <a:endParaRPr lang="en-GB" sz="1900" dirty="0" smtClean="0">
-              <a:latin typeface="Consolas" panose="020B0609020204030204" pitchFamily="49" charset="0"/>
-              <a:cs typeface="Consolas" panose="020B0609020204030204" pitchFamily="49" charset="0"/>
-            </a:endParaRPr>
           </a:p>
           <a:p>
             <a:pPr marL="0" indent="0">
@@ -13394,14 +13167,7 @@
                 <a:latin typeface="Consolas" panose="020B0609020204030204" pitchFamily="49" charset="0"/>
                 <a:cs typeface="Consolas" panose="020B0609020204030204" pitchFamily="49" charset="0"/>
               </a:rPr>
-              <a:t>    RETURN </a:t>
-            </a:r>
-            <a:r>
-              <a:rPr lang="en-GB" sz="1900" dirty="0" smtClean="0">
-                <a:latin typeface="Consolas" panose="020B0609020204030204" pitchFamily="49" charset="0"/>
-                <a:cs typeface="Consolas" panose="020B0609020204030204" pitchFamily="49" charset="0"/>
-              </a:rPr>
-              <a:t>middle</a:t>
+              <a:t>    RETURN middle</a:t>
             </a:r>
             <a:endParaRPr lang="en-GB" sz="1900" dirty="0">
               <a:latin typeface="Consolas" panose="020B0609020204030204" pitchFamily="49" charset="0"/>
@@ -13457,7 +13223,7 @@
           <a:p>
             <a:r>
               <a:rPr lang="it-IT" smtClean="0"/>
-              <a:t>INFDEV016A - G. Costantini, F. Di Giacomo, G. Maggiore</a:t>
+              <a:t>INFDEV026A - G. Costantini, F. Di Giacomo, G. Maggiore</a:t>
             </a:r>
             <a:endParaRPr lang="en-GB"/>
           </a:p>
@@ -13886,11 +13652,7 @@
             <a:pPr lvl="1"/>
             <a:r>
               <a:rPr lang="en-GB" sz="1800" dirty="0" smtClean="0"/>
-              <a:t>First call</a:t>
-            </a:r>
-            <a:r>
-              <a:rPr lang="en-GB" sz="1800" dirty="0" smtClean="0"/>
-              <a:t>?</a:t>
+              <a:t>First call?</a:t>
             </a:r>
           </a:p>
           <a:p>
@@ -13953,7 +13715,7 @@
           <a:p>
             <a:r>
               <a:rPr lang="it-IT" smtClean="0"/>
-              <a:t>INFDEV016A - G. Costantini, F. Di Giacomo, G. Maggiore</a:t>
+              <a:t>INFDEV026A - G. Costantini, F. Di Giacomo, G. Maggiore</a:t>
             </a:r>
             <a:endParaRPr lang="en-GB" dirty="0"/>
           </a:p>
@@ -14011,19 +13773,21 @@
                 <a:latin typeface="Consolas" panose="020B0609020204030204" pitchFamily="49" charset="0"/>
                 <a:cs typeface="Consolas" panose="020B0609020204030204" pitchFamily="49" charset="0"/>
               </a:rPr>
-              <a:t>(a</a:t>
-            </a:r>
+              <a:t>(a, low, high, v)</a:t>
+            </a:r>
+            <a:endParaRPr lang="en-GB" dirty="0">
+              <a:latin typeface="Consolas" panose="020B0609020204030204" pitchFamily="49" charset="0"/>
+              <a:cs typeface="Consolas" panose="020B0609020204030204" pitchFamily="49" charset="0"/>
+            </a:endParaRPr>
+          </a:p>
+          <a:p>
             <a:r>
               <a:rPr lang="en-GB" dirty="0" smtClean="0">
                 <a:latin typeface="Consolas" panose="020B0609020204030204" pitchFamily="49" charset="0"/>
                 <a:cs typeface="Consolas" panose="020B0609020204030204" pitchFamily="49" charset="0"/>
               </a:rPr>
-              <a:t>, low, high, v)</a:t>
-            </a:r>
-            <a:endParaRPr lang="en-GB" dirty="0">
-              <a:latin typeface="Consolas" panose="020B0609020204030204" pitchFamily="49" charset="0"/>
-              <a:cs typeface="Consolas" panose="020B0609020204030204" pitchFamily="49" charset="0"/>
-            </a:endParaRPr>
+              <a:t>  IF low &gt; high</a:t>
+            </a:r>
           </a:p>
           <a:p>
             <a:r>
@@ -14031,14 +13795,16 @@
                 <a:latin typeface="Consolas" panose="020B0609020204030204" pitchFamily="49" charset="0"/>
                 <a:cs typeface="Consolas" panose="020B0609020204030204" pitchFamily="49" charset="0"/>
               </a:rPr>
-              <a:t>  IF </a:t>
-            </a:r>
+              <a:t>    RETURN -1</a:t>
+            </a:r>
+          </a:p>
+          <a:p>
             <a:r>
               <a:rPr lang="en-GB" dirty="0" smtClean="0">
                 <a:latin typeface="Consolas" panose="020B0609020204030204" pitchFamily="49" charset="0"/>
                 <a:cs typeface="Consolas" panose="020B0609020204030204" pitchFamily="49" charset="0"/>
               </a:rPr>
-              <a:t>low &gt; high</a:t>
+              <a:t>  middle = (low + high) / 2</a:t>
             </a:r>
           </a:p>
           <a:p>
@@ -14047,46 +13813,7 @@
                 <a:latin typeface="Consolas" panose="020B0609020204030204" pitchFamily="49" charset="0"/>
                 <a:cs typeface="Consolas" panose="020B0609020204030204" pitchFamily="49" charset="0"/>
               </a:rPr>
-              <a:t>    RETURN </a:t>
-            </a:r>
-            <a:r>
-              <a:rPr lang="en-GB" dirty="0" smtClean="0">
-                <a:latin typeface="Consolas" panose="020B0609020204030204" pitchFamily="49" charset="0"/>
-                <a:cs typeface="Consolas" panose="020B0609020204030204" pitchFamily="49" charset="0"/>
-              </a:rPr>
-              <a:t>-1</a:t>
-            </a:r>
-          </a:p>
-          <a:p>
-            <a:r>
-              <a:rPr lang="en-GB" dirty="0" smtClean="0">
-                <a:latin typeface="Consolas" panose="020B0609020204030204" pitchFamily="49" charset="0"/>
-                <a:cs typeface="Consolas" panose="020B0609020204030204" pitchFamily="49" charset="0"/>
-              </a:rPr>
-              <a:t>  middle </a:t>
-            </a:r>
-            <a:r>
-              <a:rPr lang="en-GB" dirty="0" smtClean="0">
-                <a:latin typeface="Consolas" panose="020B0609020204030204" pitchFamily="49" charset="0"/>
-                <a:cs typeface="Consolas" panose="020B0609020204030204" pitchFamily="49" charset="0"/>
-              </a:rPr>
-              <a:t>= (low + high) / 2</a:t>
-            </a:r>
-          </a:p>
-          <a:p>
-            <a:r>
-              <a:rPr lang="en-GB" dirty="0" smtClean="0">
-                <a:latin typeface="Consolas" panose="020B0609020204030204" pitchFamily="49" charset="0"/>
-                <a:cs typeface="Consolas" panose="020B0609020204030204" pitchFamily="49" charset="0"/>
-              </a:rPr>
-              <a:t>  IF </a:t>
-            </a:r>
-            <a:r>
-              <a:rPr lang="en-GB" dirty="0" smtClean="0">
-                <a:latin typeface="Consolas" panose="020B0609020204030204" pitchFamily="49" charset="0"/>
-                <a:cs typeface="Consolas" panose="020B0609020204030204" pitchFamily="49" charset="0"/>
-              </a:rPr>
-              <a:t>a[middle] &gt; v</a:t>
+              <a:t>  IF a[middle] &gt; v</a:t>
             </a:r>
           </a:p>
           <a:p>
@@ -14109,14 +13836,39 @@
                 <a:latin typeface="Consolas" panose="020B0609020204030204" pitchFamily="49" charset="0"/>
                 <a:cs typeface="Consolas" panose="020B0609020204030204" pitchFamily="49" charset="0"/>
               </a:rPr>
-              <a:t>(a</a:t>
-            </a:r>
+              <a:t>(a, low, middle – 1, v) </a:t>
+            </a:r>
+          </a:p>
+          <a:p>
             <a:r>
               <a:rPr lang="en-GB" dirty="0" smtClean="0">
                 <a:latin typeface="Consolas" panose="020B0609020204030204" pitchFamily="49" charset="0"/>
                 <a:cs typeface="Consolas" panose="020B0609020204030204" pitchFamily="49" charset="0"/>
               </a:rPr>
-              <a:t>, low, middle – 1, v) </a:t>
+              <a:t>  ELSE IF a[middle] &lt; v</a:t>
+            </a:r>
+          </a:p>
+          <a:p>
+            <a:r>
+              <a:rPr lang="en-GB" dirty="0" smtClean="0">
+                <a:latin typeface="Consolas" panose="020B0609020204030204" pitchFamily="49" charset="0"/>
+                <a:cs typeface="Consolas" panose="020B0609020204030204" pitchFamily="49" charset="0"/>
+              </a:rPr>
+              <a:t>    </a:t>
+            </a:r>
+            <a:r>
+              <a:rPr lang="en-GB" dirty="0" err="1" smtClean="0">
+                <a:latin typeface="Consolas" panose="020B0609020204030204" pitchFamily="49" charset="0"/>
+                <a:cs typeface="Consolas" panose="020B0609020204030204" pitchFamily="49" charset="0"/>
+              </a:rPr>
+              <a:t>BinSearch</a:t>
+            </a:r>
+            <a:r>
+              <a:rPr lang="en-GB" dirty="0" smtClean="0">
+                <a:latin typeface="Consolas" panose="020B0609020204030204" pitchFamily="49" charset="0"/>
+                <a:cs typeface="Consolas" panose="020B0609020204030204" pitchFamily="49" charset="0"/>
+              </a:rPr>
+              <a:t>(a, middle + 1, high, v)</a:t>
             </a:r>
           </a:p>
           <a:p>
@@ -14127,71 +13879,14 @@
               </a:rPr>
               <a:t>  ELSE </a:t>
             </a:r>
+          </a:p>
+          <a:p>
             <a:r>
               <a:rPr lang="en-GB" dirty="0" smtClean="0">
                 <a:latin typeface="Consolas" panose="020B0609020204030204" pitchFamily="49" charset="0"/>
                 <a:cs typeface="Consolas" panose="020B0609020204030204" pitchFamily="49" charset="0"/>
               </a:rPr>
-              <a:t>IF a[middle] &lt; v</a:t>
-            </a:r>
-          </a:p>
-          <a:p>
-            <a:r>
-              <a:rPr lang="en-GB" dirty="0" smtClean="0">
-                <a:latin typeface="Consolas" panose="020B0609020204030204" pitchFamily="49" charset="0"/>
-                <a:cs typeface="Consolas" panose="020B0609020204030204" pitchFamily="49" charset="0"/>
-              </a:rPr>
-              <a:t>    </a:t>
-            </a:r>
-            <a:r>
-              <a:rPr lang="en-GB" dirty="0" err="1" smtClean="0">
-                <a:latin typeface="Consolas" panose="020B0609020204030204" pitchFamily="49" charset="0"/>
-                <a:cs typeface="Consolas" panose="020B0609020204030204" pitchFamily="49" charset="0"/>
-              </a:rPr>
-              <a:t>BinSearch</a:t>
-            </a:r>
-            <a:r>
-              <a:rPr lang="en-GB" dirty="0" smtClean="0">
-                <a:latin typeface="Consolas" panose="020B0609020204030204" pitchFamily="49" charset="0"/>
-                <a:cs typeface="Consolas" panose="020B0609020204030204" pitchFamily="49" charset="0"/>
-              </a:rPr>
-              <a:t>(a</a:t>
-            </a:r>
-            <a:r>
-              <a:rPr lang="en-GB" dirty="0" smtClean="0">
-                <a:latin typeface="Consolas" panose="020B0609020204030204" pitchFamily="49" charset="0"/>
-                <a:cs typeface="Consolas" panose="020B0609020204030204" pitchFamily="49" charset="0"/>
-              </a:rPr>
-              <a:t>, middle + 1, high, v)</a:t>
-            </a:r>
-          </a:p>
-          <a:p>
-            <a:r>
-              <a:rPr lang="en-GB" dirty="0" smtClean="0">
-                <a:latin typeface="Consolas" panose="020B0609020204030204" pitchFamily="49" charset="0"/>
-                <a:cs typeface="Consolas" panose="020B0609020204030204" pitchFamily="49" charset="0"/>
-              </a:rPr>
-              <a:t>  ELSE </a:t>
-            </a:r>
-            <a:endParaRPr lang="en-GB" dirty="0" smtClean="0">
-              <a:latin typeface="Consolas" panose="020B0609020204030204" pitchFamily="49" charset="0"/>
-              <a:cs typeface="Consolas" panose="020B0609020204030204" pitchFamily="49" charset="0"/>
-            </a:endParaRPr>
-          </a:p>
-          <a:p>
-            <a:r>
-              <a:rPr lang="en-GB" dirty="0" smtClean="0">
-                <a:latin typeface="Consolas" panose="020B0609020204030204" pitchFamily="49" charset="0"/>
-                <a:cs typeface="Consolas" panose="020B0609020204030204" pitchFamily="49" charset="0"/>
-              </a:rPr>
-              <a:t>    RETURN </a:t>
-            </a:r>
-            <a:r>
-              <a:rPr lang="en-GB" dirty="0" smtClean="0">
-                <a:latin typeface="Consolas" panose="020B0609020204030204" pitchFamily="49" charset="0"/>
-                <a:cs typeface="Consolas" panose="020B0609020204030204" pitchFamily="49" charset="0"/>
-              </a:rPr>
-              <a:t>middle</a:t>
+              <a:t>    RETURN middle</a:t>
             </a:r>
           </a:p>
           <a:p>
@@ -14370,11 +14065,7 @@
             <a:pPr lvl="1"/>
             <a:r>
               <a:rPr lang="en-GB" dirty="0" smtClean="0"/>
-              <a:t>Given the number of </a:t>
-            </a:r>
-            <a:r>
-              <a:rPr lang="en-GB" dirty="0" smtClean="0"/>
-              <a:t>elements </a:t>
+              <a:t>Given the number of elements </a:t>
             </a:r>
             <a:r>
               <a:rPr lang="en-GB" dirty="0">
@@ -14385,11 +14076,7 @@
             </a:r>
             <a:r>
               <a:rPr lang="en-GB" dirty="0" smtClean="0"/>
-              <a:t> in </a:t>
-            </a:r>
-            <a:r>
-              <a:rPr lang="en-GB" dirty="0" smtClean="0"/>
-              <a:t>the array, how many iterations will be done </a:t>
+              <a:t> in the array, how many iterations will be done </a:t>
             </a:r>
             <a:r>
               <a:rPr lang="en-GB" i="1" dirty="0" smtClean="0"/>
@@ -14419,7 +14106,7 @@
           <a:p>
             <a:r>
               <a:rPr lang="it-IT" smtClean="0"/>
-              <a:t>INFDEV016A - G. Costantini, F. Di Giacomo, G. Maggiore</a:t>
+              <a:t>INFDEV026A - G. Costantini, F. Di Giacomo, G. Maggiore</a:t>
             </a:r>
             <a:endParaRPr lang="en-GB" dirty="0"/>
           </a:p>
@@ -14523,11 +14210,7 @@
             </a:r>
             <a:r>
               <a:rPr lang="nl-NL" dirty="0" smtClean="0"/>
-              <a:t> </a:t>
-            </a:r>
-            <a:r>
-              <a:rPr lang="nl-NL" dirty="0" smtClean="0"/>
-              <a:t>analysis</a:t>
+              <a:t> analysis</a:t>
             </a:r>
             <a:endParaRPr lang="nl-NL" dirty="0"/>
           </a:p>
@@ -14727,7 +14410,7 @@
           <a:p>
             <a:r>
               <a:rPr lang="it-IT" smtClean="0"/>
-              <a:t>INFDEV016A - G. Costantini, F. Di Giacomo, G. Maggiore</a:t>
+              <a:t>INFDEV026A - G. Costantini, F. Di Giacomo, G. Maggiore</a:t>
             </a:r>
             <a:endParaRPr lang="en-GB"/>
           </a:p>
@@ -15019,7 +14702,7 @@
           <a:p>
             <a:r>
               <a:rPr lang="it-IT" smtClean="0"/>
-              <a:t>INFDEV016A - G. Costantini, F. Di Giacomo, G. Maggiore</a:t>
+              <a:t>INFDEV026A - G. Costantini, F. Di Giacomo, G. Maggiore</a:t>
             </a:r>
             <a:endParaRPr lang="en-GB"/>
           </a:p>
@@ -15548,7 +15231,7 @@
           <a:p>
             <a:r>
               <a:rPr lang="it-IT" smtClean="0"/>
-              <a:t>INFDEV016A - G. Costantini, F. Di Giacomo, G. Maggiore</a:t>
+              <a:t>INFDEV026A - G. Costantini, F. Di Giacomo, G. Maggiore</a:t>
             </a:r>
             <a:endParaRPr lang="en-GB"/>
           </a:p>
@@ -15860,11 +15543,7 @@
             </a:r>
             <a:r>
               <a:rPr lang="nl-NL" dirty="0" smtClean="0"/>
-              <a:t> </a:t>
-            </a:r>
-            <a:r>
-              <a:rPr lang="nl-NL" dirty="0" smtClean="0"/>
-              <a:t>= 1000 </a:t>
+              <a:t> = 1000 </a:t>
             </a:r>
             <a:r>
               <a:rPr lang="nl-NL" dirty="0" smtClean="0">
@@ -15897,11 +15576,7 @@
             </a:r>
             <a:r>
               <a:rPr lang="nl-NL" dirty="0" smtClean="0"/>
-              <a:t> </a:t>
-            </a:r>
-            <a:r>
-              <a:rPr lang="nl-NL" dirty="0" smtClean="0"/>
-              <a:t>= 2000 </a:t>
+              <a:t> = 2000 </a:t>
             </a:r>
             <a:r>
               <a:rPr lang="nl-NL" dirty="0" smtClean="0">
@@ -15932,13 +15607,7 @@
               <a:rPr lang="nl-NL" dirty="0" smtClean="0">
                 <a:sym typeface="Wingdings" panose="05000000000000000000" pitchFamily="2" charset="2"/>
               </a:rPr>
-              <a:t> </a:t>
-            </a:r>
-            <a:r>
-              <a:rPr lang="nl-NL" dirty="0" smtClean="0">
-                <a:sym typeface="Wingdings" panose="05000000000000000000" pitchFamily="2" charset="2"/>
-              </a:rPr>
-              <a:t>= 4000  6.4 </a:t>
+              <a:t> = 4000  6.4 </a:t>
             </a:r>
             <a:r>
               <a:rPr lang="nl-NL" dirty="0" err="1" smtClean="0">
@@ -15963,13 +15632,7 @@
               <a:rPr lang="nl-NL" dirty="0" smtClean="0">
                 <a:sym typeface="Wingdings" panose="05000000000000000000" pitchFamily="2" charset="2"/>
               </a:rPr>
-              <a:t> </a:t>
-            </a:r>
-            <a:r>
-              <a:rPr lang="nl-NL" dirty="0" smtClean="0">
-                <a:sym typeface="Wingdings" panose="05000000000000000000" pitchFamily="2" charset="2"/>
-              </a:rPr>
-              <a:t>= 8000  51.1 </a:t>
+              <a:t> = 8000  51.1 </a:t>
             </a:r>
             <a:r>
               <a:rPr lang="nl-NL" dirty="0" err="1" smtClean="0">
@@ -16010,7 +15673,7 @@
           <a:p>
             <a:r>
               <a:rPr lang="it-IT" smtClean="0"/>
-              <a:t>INFDEV016A - G. Costantini, F. Di Giacomo, G. Maggiore</a:t>
+              <a:t>INFDEV026A - G. Costantini, F. Di Giacomo, G. Maggiore</a:t>
             </a:r>
             <a:endParaRPr lang="en-GB"/>
           </a:p>
@@ -16162,7 +15825,7 @@
           <a:p>
             <a:r>
               <a:rPr lang="it-IT" smtClean="0"/>
-              <a:t>INFDEV016A - G. Costantini, F. Di Giacomo, G. Maggiore</a:t>
+              <a:t>INFDEV026A - G. Costantini, F. Di Giacomo, G. Maggiore</a:t>
             </a:r>
             <a:endParaRPr lang="en-GB" dirty="0"/>
           </a:p>
@@ -16664,7 +16327,7 @@
           <a:p>
             <a:r>
               <a:rPr lang="it-IT" smtClean="0"/>
-              <a:t>INFDEV016A - G. Costantini, F. Di Giacomo, G. Maggiore</a:t>
+              <a:t>INFDEV026A - G. Costantini, F. Di Giacomo, G. Maggiore</a:t>
             </a:r>
             <a:endParaRPr lang="en-GB"/>
           </a:p>
@@ -16993,7 +16656,7 @@
           <a:p>
             <a:r>
               <a:rPr lang="it-IT" smtClean="0"/>
-              <a:t>INFDEV016A - G. Costantini, F. Di Giacomo, G. Maggiore</a:t>
+              <a:t>INFDEV026A - G. Costantini, F. Di Giacomo, G. Maggiore</a:t>
             </a:r>
             <a:endParaRPr lang="en-GB"/>
           </a:p>
@@ -17234,11 +16897,7 @@
             </a:r>
             <a:r>
               <a:rPr lang="en-US" dirty="0" smtClean="0"/>
-              <a:t>resource use </a:t>
-            </a:r>
-            <a:r>
-              <a:rPr lang="en-US" dirty="0" smtClean="0"/>
-              <a:t>as </a:t>
+              <a:t>resource use as </a:t>
             </a:r>
             <a:r>
               <a:rPr lang="en-GB" dirty="0" smtClean="0">
@@ -17317,7 +16976,7 @@
           <a:p>
             <a:r>
               <a:rPr lang="it-IT" smtClean="0"/>
-              <a:t>INFDEV016A - G. Costantini, F. Di Giacomo, G. Maggiore</a:t>
+              <a:t>INFDEV026A - G. Costantini, F. Di Giacomo, G. Maggiore</a:t>
             </a:r>
             <a:endParaRPr lang="en-GB"/>
           </a:p>
@@ -17426,7 +17085,7 @@
           <a:p>
             <a:r>
               <a:rPr lang="it-IT" smtClean="0"/>
-              <a:t>INFDEV016A - G. Costantini, F. Di Giacomo, G. Maggiore</a:t>
+              <a:t>INFDEV026A - G. Costantini, F. Di Giacomo, G. Maggiore</a:t>
             </a:r>
             <a:endParaRPr lang="en-GB"/>
           </a:p>
@@ -17516,8 +17175,8 @@
           </a:p>
         </p:txBody>
       </p:sp>
-      <mc:AlternateContent xmlns:mc="http://schemas.openxmlformats.org/markup-compatibility/2006">
-        <mc:Choice xmlns:a14="http://schemas.microsoft.com/office/drawing/2010/main" Requires="a14">
+      <mc:AlternateContent xmlns:mc="http://schemas.openxmlformats.org/markup-compatibility/2006" xmlns:a14="http://schemas.microsoft.com/office/drawing/2010/main">
+        <mc:Choice Requires="a14">
           <p:sp>
             <p:nvSpPr>
               <p:cNvPr id="3" name="Content Placeholder 2"/>
@@ -17542,11 +17201,7 @@
               <a:p>
                 <a:r>
                   <a:rPr lang="en-GB" dirty="0" smtClean="0"/>
-                  <a:t>Mathematical </a:t>
-                </a:r>
-                <a:r>
-                  <a:rPr lang="en-GB" dirty="0" smtClean="0"/>
-                  <a:t>definition</a:t>
+                  <a:t>Mathematical definition</a:t>
                 </a:r>
               </a:p>
               <a:p>
@@ -18079,7 +17734,7 @@
             </p:txBody>
           </p:sp>
         </mc:Choice>
-        <mc:Fallback>
+        <mc:Fallback xmlns="">
           <p:sp>
             <p:nvSpPr>
               <p:cNvPr id="3" name="Content Placeholder 2"/>
@@ -18134,7 +17789,7 @@
           <a:p>
             <a:r>
               <a:rPr lang="it-IT" smtClean="0"/>
-              <a:t>INFDEV016A - G. Costantini, F. Di Giacomo, G. Maggiore</a:t>
+              <a:t>INFDEV026A - G. Costantini, F. Di Giacomo, G. Maggiore</a:t>
             </a:r>
             <a:endParaRPr lang="en-GB"/>
           </a:p>
@@ -18609,7 +18264,7 @@
           <a:p>
             <a:r>
               <a:rPr lang="it-IT" smtClean="0"/>
-              <a:t>INFDEV016A - G. Costantini, F. Di Giacomo, G. Maggiore</a:t>
+              <a:t>INFDEV026A - G. Costantini, F. Di Giacomo, G. Maggiore</a:t>
             </a:r>
             <a:endParaRPr lang="en-GB"/>
           </a:p>
@@ -19216,7 +18871,7 @@
           <a:p>
             <a:r>
               <a:rPr lang="it-IT" smtClean="0"/>
-              <a:t>INFDEV016A - G. Costantini, F. Di Giacomo, G. Maggiore</a:t>
+              <a:t>INFDEV026A - G. Costantini, F. Di Giacomo, G. Maggiore</a:t>
             </a:r>
             <a:endParaRPr lang="en-GB"/>
           </a:p>
@@ -19282,8 +18937,8 @@
           </a:p>
         </p:txBody>
       </p:sp>
-      <mc:AlternateContent xmlns:mc="http://schemas.openxmlformats.org/markup-compatibility/2006">
-        <mc:Choice xmlns:a14="http://schemas.microsoft.com/office/drawing/2010/main" Requires="a14">
+      <mc:AlternateContent xmlns:mc="http://schemas.openxmlformats.org/markup-compatibility/2006" xmlns:a14="http://schemas.microsoft.com/office/drawing/2010/main">
+        <mc:Choice Requires="a14">
           <p:sp>
             <p:nvSpPr>
               <p:cNvPr id="3" name="Content Placeholder 2"/>
@@ -19364,7 +19019,7 @@
             </p:txBody>
           </p:sp>
         </mc:Choice>
-        <mc:Fallback>
+        <mc:Fallback xmlns="">
           <p:sp>
             <p:nvSpPr>
               <p:cNvPr id="3" name="Content Placeholder 2"/>
@@ -19415,7 +19070,7 @@
           <a:p>
             <a:r>
               <a:rPr lang="it-IT" smtClean="0"/>
-              <a:t>INFDEV016A - G. Costantini, F. Di Giacomo, G. Maggiore</a:t>
+              <a:t>INFDEV026A - G. Costantini, F. Di Giacomo, G. Maggiore</a:t>
             </a:r>
             <a:endParaRPr lang="en-GB"/>
           </a:p>
@@ -19553,8 +19208,8 @@
           </a:p>
         </p:txBody>
       </p:sp>
-      <mc:AlternateContent xmlns:mc="http://schemas.openxmlformats.org/markup-compatibility/2006">
-        <mc:Choice xmlns:a14="http://schemas.microsoft.com/office/drawing/2010/main" Requires="a14">
+      <mc:AlternateContent xmlns:mc="http://schemas.openxmlformats.org/markup-compatibility/2006" xmlns:a14="http://schemas.microsoft.com/office/drawing/2010/main">
+        <mc:Choice Requires="a14">
           <p:sp>
             <p:nvSpPr>
               <p:cNvPr id="3" name="Content Placeholder 2"/>
@@ -19640,21 +19295,7 @@
                     <a:latin typeface="Consolas" panose="020B0609020204030204" pitchFamily="49" charset="0"/>
                     <a:cs typeface="Consolas" panose="020B0609020204030204" pitchFamily="49" charset="0"/>
                   </a:rPr>
-                  <a:t>  x </a:t>
-                </a:r>
-                <a:r>
-                  <a:rPr lang="en-GB" dirty="0" smtClean="0">
-                    <a:latin typeface="Consolas" panose="020B0609020204030204" pitchFamily="49" charset="0"/>
-                    <a:cs typeface="Consolas" panose="020B0609020204030204" pitchFamily="49" charset="0"/>
-                  </a:rPr>
-                  <a:t>+= </a:t>
-                </a:r>
-                <a:r>
-                  <a:rPr lang="en-GB" dirty="0" smtClean="0">
-                    <a:latin typeface="Consolas" panose="020B0609020204030204" pitchFamily="49" charset="0"/>
-                    <a:cs typeface="Consolas" panose="020B0609020204030204" pitchFamily="49" charset="0"/>
-                  </a:rPr>
-                  <a:t>a[</a:t>
+                  <a:t>  x += a[</a:t>
                 </a:r>
                 <a:r>
                   <a:rPr lang="en-GB" dirty="0" err="1" smtClean="0">
@@ -19678,7 +19319,7 @@
             </p:txBody>
           </p:sp>
         </mc:Choice>
-        <mc:Fallback>
+        <mc:Fallback xmlns="">
           <p:sp>
             <p:nvSpPr>
               <p:cNvPr id="3" name="Content Placeholder 2"/>
@@ -19729,7 +19370,7 @@
           <a:p>
             <a:r>
               <a:rPr lang="it-IT" smtClean="0"/>
-              <a:t>INFDEV016A - G. Costantini, F. Di Giacomo, G. Maggiore</a:t>
+              <a:t>INFDEV026A - G. Costantini, F. Di Giacomo, G. Maggiore</a:t>
             </a:r>
             <a:endParaRPr lang="en-GB"/>
           </a:p>
@@ -20060,7 +19701,7 @@
           <a:p>
             <a:r>
               <a:rPr lang="it-IT" smtClean="0"/>
-              <a:t>INFDEV016A - G. Costantini, F. Di Giacomo, G. Maggiore</a:t>
+              <a:t>INFDEV026A - G. Costantini, F. Di Giacomo, G. Maggiore</a:t>
             </a:r>
             <a:endParaRPr lang="en-GB"/>
           </a:p>
@@ -20134,8 +19775,8 @@
           </a:p>
         </p:txBody>
       </p:sp>
-      <mc:AlternateContent xmlns:mc="http://schemas.openxmlformats.org/markup-compatibility/2006">
-        <mc:Choice xmlns:a14="http://schemas.microsoft.com/office/drawing/2010/main" Requires="a14">
+      <mc:AlternateContent xmlns:mc="http://schemas.openxmlformats.org/markup-compatibility/2006" xmlns:a14="http://schemas.microsoft.com/office/drawing/2010/main">
+        <mc:Choice Requires="a14">
           <p:sp>
             <p:nvSpPr>
               <p:cNvPr id="3" name="Content Placeholder 2"/>
@@ -20309,7 +19950,7 @@
             </p:txBody>
           </p:sp>
         </mc:Choice>
-        <mc:Fallback>
+        <mc:Fallback xmlns="">
           <p:sp>
             <p:nvSpPr>
               <p:cNvPr id="3" name="Content Placeholder 2"/>
@@ -20360,7 +20001,7 @@
           <a:p>
             <a:r>
               <a:rPr lang="it-IT" smtClean="0"/>
-              <a:t>INFDEV016A - G. Costantini, F. Di Giacomo, G. Maggiore</a:t>
+              <a:t>INFDEV026A - G. Costantini, F. Di Giacomo, G. Maggiore</a:t>
             </a:r>
             <a:endParaRPr lang="en-GB"/>
           </a:p>
@@ -20506,8 +20147,8 @@
           </a:p>
         </p:txBody>
       </p:sp>
-      <mc:AlternateContent xmlns:mc="http://schemas.openxmlformats.org/markup-compatibility/2006">
-        <mc:Choice xmlns:a14="http://schemas.microsoft.com/office/drawing/2010/main" Requires="a14">
+      <mc:AlternateContent xmlns:mc="http://schemas.openxmlformats.org/markup-compatibility/2006" xmlns:a14="http://schemas.microsoft.com/office/drawing/2010/main">
+        <mc:Choice Requires="a14">
           <p:sp>
             <p:nvSpPr>
               <p:cNvPr id="3" name="Content Placeholder 2"/>
@@ -20622,14 +20263,7 @@
                     <a:latin typeface="Consolas" panose="020B0609020204030204" pitchFamily="49" charset="0"/>
                     <a:cs typeface="Consolas" panose="020B0609020204030204" pitchFamily="49" charset="0"/>
                   </a:rPr>
-                  <a:t> </a:t>
-                </a:r>
-                <a:r>
-                  <a:rPr lang="en-GB" sz="1800" dirty="0" smtClean="0">
-                    <a:latin typeface="Consolas" panose="020B0609020204030204" pitchFamily="49" charset="0"/>
-                    <a:cs typeface="Consolas" panose="020B0609020204030204" pitchFamily="49" charset="0"/>
-                  </a:rPr>
-                  <a:t>IF </a:t>
+                  <a:t> IF </a:t>
                 </a:r>
                 <a:r>
                   <a:rPr lang="en-GB" sz="1800" dirty="0">
@@ -20720,7 +20354,7 @@
             </p:txBody>
           </p:sp>
         </mc:Choice>
-        <mc:Fallback>
+        <mc:Fallback xmlns="">
           <p:sp>
             <p:nvSpPr>
               <p:cNvPr id="3" name="Content Placeholder 2"/>
@@ -20771,7 +20405,7 @@
           <a:p>
             <a:r>
               <a:rPr lang="it-IT" smtClean="0"/>
-              <a:t>INFDEV016A - G. Costantini, F. Di Giacomo, G. Maggiore</a:t>
+              <a:t>INFDEV026A - G. Costantini, F. Di Giacomo, G. Maggiore</a:t>
             </a:r>
             <a:endParaRPr lang="en-GB"/>
           </a:p>
@@ -20917,8 +20551,8 @@
           </a:p>
         </p:txBody>
       </p:sp>
-      <mc:AlternateContent xmlns:mc="http://schemas.openxmlformats.org/markup-compatibility/2006">
-        <mc:Choice xmlns:a14="http://schemas.microsoft.com/office/drawing/2010/main" Requires="a14">
+      <mc:AlternateContent xmlns:mc="http://schemas.openxmlformats.org/markup-compatibility/2006" xmlns:a14="http://schemas.microsoft.com/office/drawing/2010/main">
+        <mc:Choice Requires="a14">
           <p:sp>
             <p:nvSpPr>
               <p:cNvPr id="3" name="Content Placeholder 2"/>
@@ -21122,21 +20756,7 @@
                     <a:latin typeface="Consolas" panose="020B0609020204030204" pitchFamily="49" charset="0"/>
                     <a:cs typeface="Consolas" panose="020B0609020204030204" pitchFamily="49" charset="0"/>
                   </a:rPr>
-                  <a:t> </a:t>
-                </a:r>
-                <a:r>
-                  <a:rPr lang="en-GB" dirty="0" smtClean="0">
-                    <a:latin typeface="Consolas" panose="020B0609020204030204" pitchFamily="49" charset="0"/>
-                    <a:cs typeface="Consolas" panose="020B0609020204030204" pitchFamily="49" charset="0"/>
-                  </a:rPr>
-                  <a:t>IF </a:t>
-                </a:r>
-                <a:r>
-                  <a:rPr lang="en-GB" dirty="0" smtClean="0">
-                    <a:latin typeface="Consolas" panose="020B0609020204030204" pitchFamily="49" charset="0"/>
-                    <a:cs typeface="Consolas" panose="020B0609020204030204" pitchFamily="49" charset="0"/>
-                  </a:rPr>
-                  <a:t>N = 0</a:t>
+                  <a:t> IF N = 0</a:t>
                 </a:r>
               </a:p>
               <a:p>
@@ -21150,10 +20770,6 @@
                   </a:rPr>
                   <a:t>    1</a:t>
                 </a:r>
-                <a:endParaRPr lang="en-GB" dirty="0" smtClean="0">
-                  <a:latin typeface="Consolas" panose="020B0609020204030204" pitchFamily="49" charset="0"/>
-                  <a:cs typeface="Consolas" panose="020B0609020204030204" pitchFamily="49" charset="0"/>
-                </a:endParaRPr>
               </a:p>
               <a:p>
                 <a:pPr marL="0" indent="0">
@@ -21187,14 +20803,7 @@
                     <a:latin typeface="Consolas" panose="020B0609020204030204" pitchFamily="49" charset="0"/>
                     <a:cs typeface="Consolas" panose="020B0609020204030204" pitchFamily="49" charset="0"/>
                   </a:rPr>
-                  <a:t>   </a:t>
-                </a:r>
-                <a:r>
-                  <a:rPr lang="en-GB" dirty="0" smtClean="0">
-                    <a:latin typeface="Consolas" panose="020B0609020204030204" pitchFamily="49" charset="0"/>
-                    <a:cs typeface="Consolas" panose="020B0609020204030204" pitchFamily="49" charset="0"/>
-                  </a:rPr>
-                  <a:t>N </a:t>
+                  <a:t>   N </a:t>
                 </a:r>
                 <a14:m>
                   <m:oMath xmlns:m="http://schemas.openxmlformats.org/officeDocument/2006/math">
@@ -21233,7 +20842,7 @@
             </p:txBody>
           </p:sp>
         </mc:Choice>
-        <mc:Fallback>
+        <mc:Fallback xmlns="">
           <p:sp>
             <p:nvSpPr>
               <p:cNvPr id="3" name="Content Placeholder 2"/>
@@ -21288,7 +20897,7 @@
           <a:p>
             <a:r>
               <a:rPr lang="it-IT" smtClean="0"/>
-              <a:t>INFDEV016A - G. Costantini, F. Di Giacomo, G. Maggiore</a:t>
+              <a:t>INFDEV026A - G. Costantini, F. Di Giacomo, G. Maggiore</a:t>
             </a:r>
             <a:endParaRPr lang="en-GB"/>
           </a:p>
@@ -21671,7 +21280,7 @@
           <a:p>
             <a:r>
               <a:rPr lang="it-IT" smtClean="0"/>
-              <a:t>INFDEV016A - G. Costantini, F. Di Giacomo, G. Maggiore</a:t>
+              <a:t>INFDEV026A - G. Costantini, F. Di Giacomo, G. Maggiore</a:t>
             </a:r>
             <a:endParaRPr lang="en-GB"/>
           </a:p>
@@ -21729,19 +21338,21 @@
                 <a:latin typeface="Consolas" panose="020B0609020204030204" pitchFamily="49" charset="0"/>
                 <a:cs typeface="Consolas" panose="020B0609020204030204" pitchFamily="49" charset="0"/>
               </a:rPr>
-              <a:t>(a</a:t>
-            </a:r>
+              <a:t>(a, low, high, v)</a:t>
+            </a:r>
+            <a:endParaRPr lang="en-GB" dirty="0">
+              <a:latin typeface="Consolas" panose="020B0609020204030204" pitchFamily="49" charset="0"/>
+              <a:cs typeface="Consolas" panose="020B0609020204030204" pitchFamily="49" charset="0"/>
+            </a:endParaRPr>
+          </a:p>
+          <a:p>
             <a:r>
               <a:rPr lang="en-GB" dirty="0" smtClean="0">
                 <a:latin typeface="Consolas" panose="020B0609020204030204" pitchFamily="49" charset="0"/>
                 <a:cs typeface="Consolas" panose="020B0609020204030204" pitchFamily="49" charset="0"/>
               </a:rPr>
-              <a:t>, low, high, v)</a:t>
-            </a:r>
-            <a:endParaRPr lang="en-GB" dirty="0">
-              <a:latin typeface="Consolas" panose="020B0609020204030204" pitchFamily="49" charset="0"/>
-              <a:cs typeface="Consolas" panose="020B0609020204030204" pitchFamily="49" charset="0"/>
-            </a:endParaRPr>
+              <a:t>  IF low &gt; high</a:t>
+            </a:r>
           </a:p>
           <a:p>
             <a:r>
@@ -21749,14 +21360,16 @@
                 <a:latin typeface="Consolas" panose="020B0609020204030204" pitchFamily="49" charset="0"/>
                 <a:cs typeface="Consolas" panose="020B0609020204030204" pitchFamily="49" charset="0"/>
               </a:rPr>
-              <a:t>  IF </a:t>
-            </a:r>
+              <a:t>    RETURN -1</a:t>
+            </a:r>
+          </a:p>
+          <a:p>
             <a:r>
               <a:rPr lang="en-GB" dirty="0" smtClean="0">
                 <a:latin typeface="Consolas" panose="020B0609020204030204" pitchFamily="49" charset="0"/>
                 <a:cs typeface="Consolas" panose="020B0609020204030204" pitchFamily="49" charset="0"/>
               </a:rPr>
-              <a:t>low &gt; high</a:t>
+              <a:t>  middle = (low + high) / 2</a:t>
             </a:r>
           </a:p>
           <a:p>
@@ -21765,46 +21378,7 @@
                 <a:latin typeface="Consolas" panose="020B0609020204030204" pitchFamily="49" charset="0"/>
                 <a:cs typeface="Consolas" panose="020B0609020204030204" pitchFamily="49" charset="0"/>
               </a:rPr>
-              <a:t>    RETURN </a:t>
-            </a:r>
-            <a:r>
-              <a:rPr lang="en-GB" dirty="0" smtClean="0">
-                <a:latin typeface="Consolas" panose="020B0609020204030204" pitchFamily="49" charset="0"/>
-                <a:cs typeface="Consolas" panose="020B0609020204030204" pitchFamily="49" charset="0"/>
-              </a:rPr>
-              <a:t>-1</a:t>
-            </a:r>
-          </a:p>
-          <a:p>
-            <a:r>
-              <a:rPr lang="en-GB" dirty="0" smtClean="0">
-                <a:latin typeface="Consolas" panose="020B0609020204030204" pitchFamily="49" charset="0"/>
-                <a:cs typeface="Consolas" panose="020B0609020204030204" pitchFamily="49" charset="0"/>
-              </a:rPr>
-              <a:t>  middle </a:t>
-            </a:r>
-            <a:r>
-              <a:rPr lang="en-GB" dirty="0" smtClean="0">
-                <a:latin typeface="Consolas" panose="020B0609020204030204" pitchFamily="49" charset="0"/>
-                <a:cs typeface="Consolas" panose="020B0609020204030204" pitchFamily="49" charset="0"/>
-              </a:rPr>
-              <a:t>= (low + high) / 2</a:t>
-            </a:r>
-          </a:p>
-          <a:p>
-            <a:r>
-              <a:rPr lang="en-GB" dirty="0" smtClean="0">
-                <a:latin typeface="Consolas" panose="020B0609020204030204" pitchFamily="49" charset="0"/>
-                <a:cs typeface="Consolas" panose="020B0609020204030204" pitchFamily="49" charset="0"/>
-              </a:rPr>
-              <a:t>  IF </a:t>
-            </a:r>
-            <a:r>
-              <a:rPr lang="en-GB" dirty="0" smtClean="0">
-                <a:latin typeface="Consolas" panose="020B0609020204030204" pitchFamily="49" charset="0"/>
-                <a:cs typeface="Consolas" panose="020B0609020204030204" pitchFamily="49" charset="0"/>
-              </a:rPr>
-              <a:t>a[middle] &gt; v</a:t>
+              <a:t>  IF a[middle] &gt; v</a:t>
             </a:r>
           </a:p>
           <a:p>
@@ -21827,14 +21401,39 @@
                 <a:latin typeface="Consolas" panose="020B0609020204030204" pitchFamily="49" charset="0"/>
                 <a:cs typeface="Consolas" panose="020B0609020204030204" pitchFamily="49" charset="0"/>
               </a:rPr>
-              <a:t>(a</a:t>
-            </a:r>
+              <a:t>(a, low, middle – 1, v) </a:t>
+            </a:r>
+          </a:p>
+          <a:p>
             <a:r>
               <a:rPr lang="en-GB" dirty="0" smtClean="0">
                 <a:latin typeface="Consolas" panose="020B0609020204030204" pitchFamily="49" charset="0"/>
                 <a:cs typeface="Consolas" panose="020B0609020204030204" pitchFamily="49" charset="0"/>
               </a:rPr>
-              <a:t>, low, middle – 1, v) </a:t>
+              <a:t>  ELSE IF a[middle] &lt; v</a:t>
+            </a:r>
+          </a:p>
+          <a:p>
+            <a:r>
+              <a:rPr lang="en-GB" dirty="0" smtClean="0">
+                <a:latin typeface="Consolas" panose="020B0609020204030204" pitchFamily="49" charset="0"/>
+                <a:cs typeface="Consolas" panose="020B0609020204030204" pitchFamily="49" charset="0"/>
+              </a:rPr>
+              <a:t>    </a:t>
+            </a:r>
+            <a:r>
+              <a:rPr lang="en-GB" dirty="0" err="1" smtClean="0">
+                <a:latin typeface="Consolas" panose="020B0609020204030204" pitchFamily="49" charset="0"/>
+                <a:cs typeface="Consolas" panose="020B0609020204030204" pitchFamily="49" charset="0"/>
+              </a:rPr>
+              <a:t>BinSearch</a:t>
+            </a:r>
+            <a:r>
+              <a:rPr lang="en-GB" dirty="0" smtClean="0">
+                <a:latin typeface="Consolas" panose="020B0609020204030204" pitchFamily="49" charset="0"/>
+                <a:cs typeface="Consolas" panose="020B0609020204030204" pitchFamily="49" charset="0"/>
+              </a:rPr>
+              <a:t>(a, middle + 1, high, v)</a:t>
             </a:r>
           </a:p>
           <a:p>
@@ -21845,71 +21444,14 @@
               </a:rPr>
               <a:t>  ELSE </a:t>
             </a:r>
+          </a:p>
+          <a:p>
             <a:r>
               <a:rPr lang="en-GB" dirty="0" smtClean="0">
                 <a:latin typeface="Consolas" panose="020B0609020204030204" pitchFamily="49" charset="0"/>
                 <a:cs typeface="Consolas" panose="020B0609020204030204" pitchFamily="49" charset="0"/>
               </a:rPr>
-              <a:t>IF a[middle] &lt; v</a:t>
-            </a:r>
-          </a:p>
-          <a:p>
-            <a:r>
-              <a:rPr lang="en-GB" dirty="0" smtClean="0">
-                <a:latin typeface="Consolas" panose="020B0609020204030204" pitchFamily="49" charset="0"/>
-                <a:cs typeface="Consolas" panose="020B0609020204030204" pitchFamily="49" charset="0"/>
-              </a:rPr>
-              <a:t>    </a:t>
-            </a:r>
-            <a:r>
-              <a:rPr lang="en-GB" dirty="0" err="1" smtClean="0">
-                <a:latin typeface="Consolas" panose="020B0609020204030204" pitchFamily="49" charset="0"/>
-                <a:cs typeface="Consolas" panose="020B0609020204030204" pitchFamily="49" charset="0"/>
-              </a:rPr>
-              <a:t>BinSearch</a:t>
-            </a:r>
-            <a:r>
-              <a:rPr lang="en-GB" dirty="0" smtClean="0">
-                <a:latin typeface="Consolas" panose="020B0609020204030204" pitchFamily="49" charset="0"/>
-                <a:cs typeface="Consolas" panose="020B0609020204030204" pitchFamily="49" charset="0"/>
-              </a:rPr>
-              <a:t>(a</a:t>
-            </a:r>
-            <a:r>
-              <a:rPr lang="en-GB" dirty="0" smtClean="0">
-                <a:latin typeface="Consolas" panose="020B0609020204030204" pitchFamily="49" charset="0"/>
-                <a:cs typeface="Consolas" panose="020B0609020204030204" pitchFamily="49" charset="0"/>
-              </a:rPr>
-              <a:t>, middle + 1, high, v)</a:t>
-            </a:r>
-          </a:p>
-          <a:p>
-            <a:r>
-              <a:rPr lang="en-GB" dirty="0" smtClean="0">
-                <a:latin typeface="Consolas" panose="020B0609020204030204" pitchFamily="49" charset="0"/>
-                <a:cs typeface="Consolas" panose="020B0609020204030204" pitchFamily="49" charset="0"/>
-              </a:rPr>
-              <a:t>  ELSE </a:t>
-            </a:r>
-            <a:endParaRPr lang="en-GB" dirty="0" smtClean="0">
-              <a:latin typeface="Consolas" panose="020B0609020204030204" pitchFamily="49" charset="0"/>
-              <a:cs typeface="Consolas" panose="020B0609020204030204" pitchFamily="49" charset="0"/>
-            </a:endParaRPr>
-          </a:p>
-          <a:p>
-            <a:r>
-              <a:rPr lang="en-GB" dirty="0" smtClean="0">
-                <a:latin typeface="Consolas" panose="020B0609020204030204" pitchFamily="49" charset="0"/>
-                <a:cs typeface="Consolas" panose="020B0609020204030204" pitchFamily="49" charset="0"/>
-              </a:rPr>
-              <a:t>    RETURN </a:t>
-            </a:r>
-            <a:r>
-              <a:rPr lang="en-GB" dirty="0" smtClean="0">
-                <a:latin typeface="Consolas" panose="020B0609020204030204" pitchFamily="49" charset="0"/>
-                <a:cs typeface="Consolas" panose="020B0609020204030204" pitchFamily="49" charset="0"/>
-              </a:rPr>
-              <a:t>middle</a:t>
+              <a:t>    RETURN middle</a:t>
             </a:r>
           </a:p>
           <a:p>
@@ -22157,8 +21699,8 @@
           </a:p>
         </p:txBody>
       </p:sp>
-      <mc:AlternateContent xmlns:mc="http://schemas.openxmlformats.org/markup-compatibility/2006">
-        <mc:Choice xmlns:a14="http://schemas.microsoft.com/office/drawing/2010/main" Requires="a14">
+      <mc:AlternateContent xmlns:mc="http://schemas.openxmlformats.org/markup-compatibility/2006" xmlns:a14="http://schemas.microsoft.com/office/drawing/2010/main">
+        <mc:Choice Requires="a14">
           <p:sp>
             <p:nvSpPr>
               <p:cNvPr id="3" name="Content Placeholder 2"/>
@@ -22278,21 +21820,7 @@
                     <a:latin typeface="Consolas" panose="020B0609020204030204" pitchFamily="49" charset="0"/>
                     <a:cs typeface="Consolas" panose="020B0609020204030204" pitchFamily="49" charset="0"/>
                   </a:rPr>
-                  <a:t> </a:t>
-                </a:r>
-                <a:r>
-                  <a:rPr lang="en-GB" dirty="0" smtClean="0">
-                    <a:latin typeface="Consolas" panose="020B0609020204030204" pitchFamily="49" charset="0"/>
-                    <a:cs typeface="Consolas" panose="020B0609020204030204" pitchFamily="49" charset="0"/>
-                  </a:rPr>
-                  <a:t>FOR </a:t>
-                </a:r>
-                <a:r>
-                  <a:rPr lang="en-GB" dirty="0" smtClean="0">
-                    <a:latin typeface="Consolas" panose="020B0609020204030204" pitchFamily="49" charset="0"/>
-                    <a:cs typeface="Consolas" panose="020B0609020204030204" pitchFamily="49" charset="0"/>
-                  </a:rPr>
-                  <a:t>j = 1 TO N</a:t>
+                  <a:t> FOR j = 1 TO N</a:t>
                 </a:r>
               </a:p>
               <a:p>
@@ -22304,14 +21832,7 @@
                     <a:latin typeface="Consolas" panose="020B0609020204030204" pitchFamily="49" charset="0"/>
                     <a:cs typeface="Consolas" panose="020B0609020204030204" pitchFamily="49" charset="0"/>
                   </a:rPr>
-                  <a:t>    v </a:t>
-                </a:r>
-                <a:r>
-                  <a:rPr lang="en-GB" dirty="0" smtClean="0">
-                    <a:latin typeface="Consolas" panose="020B0609020204030204" pitchFamily="49" charset="0"/>
-                    <a:cs typeface="Consolas" panose="020B0609020204030204" pitchFamily="49" charset="0"/>
-                  </a:rPr>
-                  <a:t>+= </a:t>
+                  <a:t>    v += </a:t>
                 </a:r>
                 <a:r>
                   <a:rPr lang="en-GB" dirty="0" err="1" smtClean="0">
@@ -22338,7 +21859,7 @@
             </p:txBody>
           </p:sp>
         </mc:Choice>
-        <mc:Fallback>
+        <mc:Fallback xmlns="">
           <p:sp>
             <p:nvSpPr>
               <p:cNvPr id="3" name="Content Placeholder 2"/>
@@ -22389,7 +21910,7 @@
           <a:p>
             <a:r>
               <a:rPr lang="it-IT" smtClean="0"/>
-              <a:t>INFDEV016A - G. Costantini, F. Di Giacomo, G. Maggiore</a:t>
+              <a:t>INFDEV026A - G. Costantini, F. Di Giacomo, G. Maggiore</a:t>
             </a:r>
             <a:endParaRPr lang="en-GB"/>
           </a:p>
@@ -22527,8 +22048,8 @@
           </a:p>
         </p:txBody>
       </p:sp>
-      <mc:AlternateContent xmlns:mc="http://schemas.openxmlformats.org/markup-compatibility/2006">
-        <mc:Choice xmlns:a14="http://schemas.microsoft.com/office/drawing/2010/main" Requires="a14">
+      <mc:AlternateContent xmlns:mc="http://schemas.openxmlformats.org/markup-compatibility/2006" xmlns:a14="http://schemas.microsoft.com/office/drawing/2010/main">
+        <mc:Choice Requires="a14">
           <p:sp>
             <p:nvSpPr>
               <p:cNvPr id="3" name="Tijdelijke aanduiding voor inhoud 2"/>
@@ -22706,14 +22227,7 @@
                     <a:latin typeface="Consolas" panose="020B0609020204030204" pitchFamily="49" charset="0"/>
                     <a:cs typeface="Consolas" panose="020B0609020204030204" pitchFamily="49" charset="0"/>
                   </a:rPr>
-                  <a:t>TO</a:t>
-                </a:r>
-                <a:r>
-                  <a:rPr lang="nl-NL" dirty="0" smtClean="0">
-                    <a:latin typeface="Consolas" panose="020B0609020204030204" pitchFamily="49" charset="0"/>
-                    <a:cs typeface="Consolas" panose="020B0609020204030204" pitchFamily="49" charset="0"/>
-                  </a:rPr>
-                  <a:t> N</a:t>
+                  <a:t>TO N</a:t>
                 </a:r>
                 <a:endParaRPr lang="nl-NL" dirty="0">
                   <a:latin typeface="Consolas" panose="020B0609020204030204" pitchFamily="49" charset="0"/>
@@ -22812,15 +22326,11 @@
                   </a:rPr>
                   <a:t>++</a:t>
                 </a:r>
-                <a:endParaRPr lang="nl-NL" dirty="0" smtClean="0">
-                  <a:latin typeface="Consolas" panose="020B0609020204030204" pitchFamily="49" charset="0"/>
-                  <a:cs typeface="Consolas" panose="020B0609020204030204" pitchFamily="49" charset="0"/>
-                </a:endParaRPr>
               </a:p>
             </p:txBody>
           </p:sp>
         </mc:Choice>
-        <mc:Fallback>
+        <mc:Fallback xmlns="">
           <p:sp>
             <p:nvSpPr>
               <p:cNvPr id="3" name="Tijdelijke aanduiding voor inhoud 2"/>
@@ -22871,7 +22381,7 @@
           <a:p>
             <a:r>
               <a:rPr lang="it-IT" smtClean="0"/>
-              <a:t>INFDEV016A - G. Costantini, F. Di Giacomo, G. Maggiore</a:t>
+              <a:t>INFDEV026A - G. Costantini, F. Di Giacomo, G. Maggiore</a:t>
             </a:r>
             <a:endParaRPr lang="en-GB" dirty="0"/>
           </a:p>
@@ -23059,7 +22569,7 @@
           <a:p>
             <a:r>
               <a:rPr lang="it-IT" smtClean="0"/>
-              <a:t>INFDEV016A - G. Costantini, F. Di Giacomo, G. Maggiore</a:t>
+              <a:t>INFDEV026A - G. Costantini, F. Di Giacomo, G. Maggiore</a:t>
             </a:r>
             <a:endParaRPr lang="en-GB"/>
           </a:p>
@@ -23175,7 +22685,7 @@
           <a:p>
             <a:r>
               <a:rPr lang="it-IT" smtClean="0"/>
-              <a:t>INFDEV016A - G. Costantini, F. Di Giacomo, G. Maggiore</a:t>
+              <a:t>INFDEV026A - G. Costantini, F. Di Giacomo, G. Maggiore</a:t>
             </a:r>
             <a:endParaRPr lang="en-GB"/>
           </a:p>
@@ -23262,7 +22772,7 @@
           <a:p>
             <a:r>
               <a:rPr lang="it-IT" smtClean="0"/>
-              <a:t>INFDEV016A - G. Costantini, F. Di Giacomo, G. Maggiore</a:t>
+              <a:t>INFDEV026A - G. Costantini, F. Di Giacomo, G. Maggiore</a:t>
             </a:r>
             <a:endParaRPr lang="en-GB"/>
           </a:p>
@@ -23408,7 +22918,7 @@
           <a:p>
             <a:r>
               <a:rPr lang="it-IT" smtClean="0"/>
-              <a:t>INFDEV016A - G. Costantini, F. Di Giacomo, G. Maggiore</a:t>
+              <a:t>INFDEV026A - G. Costantini, F. Di Giacomo, G. Maggiore</a:t>
             </a:r>
             <a:endParaRPr lang="en-GB"/>
           </a:p>
@@ -23669,7 +23179,7 @@
           <a:p>
             <a:r>
               <a:rPr lang="it-IT" smtClean="0"/>
-              <a:t>INFDEV016A - G. Costantini, F. Di Giacomo, G. Maggiore</a:t>
+              <a:t>INFDEV026A - G. Costantini, F. Di Giacomo, G. Maggiore</a:t>
             </a:r>
             <a:endParaRPr lang="en-GB"/>
           </a:p>
@@ -23867,7 +23377,7 @@
           <a:p>
             <a:r>
               <a:rPr lang="it-IT" smtClean="0"/>
-              <a:t>INFDEV016A - G. Costantini, F. Di Giacomo, G. Maggiore</a:t>
+              <a:t>INFDEV026A - G. Costantini, F. Di Giacomo, G. Maggiore</a:t>
             </a:r>
             <a:endParaRPr lang="en-GB"/>
           </a:p>
@@ -23983,7 +23493,7 @@
           <a:p>
             <a:r>
               <a:rPr lang="it-IT" smtClean="0"/>
-              <a:t>INFDEV016A - G. Costantini, F. Di Giacomo, G. Maggiore</a:t>
+              <a:t>INFDEV026A - G. Costantini, F. Di Giacomo, G. Maggiore</a:t>
             </a:r>
             <a:endParaRPr lang="en-GB"/>
           </a:p>
@@ -24070,7 +23580,7 @@
           <a:p>
             <a:r>
               <a:rPr lang="it-IT" smtClean="0"/>
-              <a:t>INFDEV016A - G. Costantini, F. Di Giacomo, G. Maggiore</a:t>
+              <a:t>INFDEV026A - G. Costantini, F. Di Giacomo, G. Maggiore</a:t>
             </a:r>
             <a:endParaRPr lang="en-GB"/>
           </a:p>
@@ -24187,7 +23697,7 @@
           <a:p>
             <a:r>
               <a:rPr lang="it-IT" smtClean="0"/>
-              <a:t>INFDEV016A - G. Costantini, F. Di Giacomo, G. Maggiore</a:t>
+              <a:t>INFDEV026A - G. Costantini, F. Di Giacomo, G. Maggiore</a:t>
             </a:r>
             <a:endParaRPr lang="en-GB"/>
           </a:p>
@@ -24304,7 +23814,7 @@
           <a:p>
             <a:r>
               <a:rPr lang="it-IT" smtClean="0"/>
-              <a:t>INFDEV016A - G. Costantini, F. Di Giacomo, G. Maggiore</a:t>
+              <a:t>INFDEV026A - G. Costantini, F. Di Giacomo, G. Maggiore</a:t>
             </a:r>
             <a:endParaRPr lang="en-GB"/>
           </a:p>
@@ -24425,9 +23935,50 @@
               <a:rPr lang="en-GB" sz="2000" dirty="0" smtClean="0">
                 <a:sym typeface="Wingdings" panose="05000000000000000000" pitchFamily="2" charset="2"/>
               </a:rPr>
-              <a:t> </a:t>
-            </a:r>
-            <a:endParaRPr lang="en-GB" sz="2000" dirty="0"/>
+              <a:t></a:t>
+            </a:r>
+          </a:p>
+          <a:p>
+            <a:endParaRPr lang="en-GB" sz="2000" b="1" dirty="0">
+              <a:solidFill>
+                <a:srgbClr val="FF0000"/>
+              </a:solidFill>
+              <a:sym typeface="Wingdings" panose="05000000000000000000" pitchFamily="2" charset="2"/>
+            </a:endParaRPr>
+          </a:p>
+          <a:p>
+            <a:r>
+              <a:rPr lang="en-GB" sz="2000" b="1" dirty="0" smtClean="0">
+                <a:solidFill>
+                  <a:srgbClr val="FF0000"/>
+                </a:solidFill>
+                <a:sym typeface="Wingdings" panose="05000000000000000000" pitchFamily="2" charset="2"/>
+              </a:rPr>
+              <a:t>PS: PRACTICE USING C# </a:t>
+            </a:r>
+            <a:r>
+              <a:rPr lang="en-GB" sz="2000" b="1" dirty="0" smtClean="0">
+                <a:solidFill>
+                  <a:srgbClr val="FF0000"/>
+                </a:solidFill>
+                <a:sym typeface="Wingdings" panose="05000000000000000000" pitchFamily="2" charset="2"/>
+              </a:rPr>
+              <a:t>AND </a:t>
+            </a:r>
+            <a:r>
+              <a:rPr lang="en-GB" sz="2000" b="1" dirty="0" smtClean="0">
+                <a:solidFill>
+                  <a:srgbClr val="FF0000"/>
+                </a:solidFill>
+                <a:sym typeface="Wingdings" panose="05000000000000000000" pitchFamily="2" charset="2"/>
+              </a:rPr>
+              <a:t>GITHUB!!!</a:t>
+            </a:r>
+            <a:endParaRPr lang="en-GB" sz="2000" b="1" dirty="0">
+              <a:solidFill>
+                <a:srgbClr val="FF0000"/>
+              </a:solidFill>
+            </a:endParaRPr>
           </a:p>
         </p:txBody>
       </p:sp>
@@ -24448,7 +23999,7 @@
           <a:p>
             <a:r>
               <a:rPr lang="it-IT" smtClean="0"/>
-              <a:t>INFDEV016A - G. Costantini, F. Di Giacomo, G. Maggiore</a:t>
+              <a:t>INFDEV026A - G. Costantini, F. Di Giacomo, G. Maggiore</a:t>
             </a:r>
             <a:endParaRPr lang="en-GB"/>
           </a:p>
@@ -24606,7 +24157,7 @@
           <a:p>
             <a:r>
               <a:rPr lang="it-IT" smtClean="0"/>
-              <a:t>INFDEV016A - G. Costantini, F. Di Giacomo, G. Maggiore</a:t>
+              <a:t>INFDEV026A - G. Costantini, F. Di Giacomo, G. Maggiore</a:t>
             </a:r>
             <a:endParaRPr lang="en-GB"/>
           </a:p>
@@ -24775,7 +24326,7 @@
           <a:p>
             <a:r>
               <a:rPr lang="it-IT" smtClean="0"/>
-              <a:t>INFDEV016A - G. Costantini, F. Di Giacomo, G. Maggiore</a:t>
+              <a:t>INFDEV026A - G. Costantini, F. Di Giacomo, G. Maggiore</a:t>
             </a:r>
             <a:endParaRPr lang="en-GB"/>
           </a:p>
@@ -24948,13 +24499,8 @@
             </a:r>
             <a:r>
               <a:rPr lang="nl-NL" dirty="0" smtClean="0"/>
-              <a:t> </a:t>
-            </a:r>
-            <a:r>
-              <a:rPr lang="nl-NL" dirty="0" smtClean="0"/>
-              <a:t>analysis</a:t>
-            </a:r>
-            <a:endParaRPr lang="nl-NL" dirty="0" smtClean="0"/>
+              <a:t> analysis</a:t>
+            </a:r>
           </a:p>
         </p:txBody>
       </p:sp>
@@ -24975,7 +24521,7 @@
           <a:p>
             <a:r>
               <a:rPr lang="it-IT" smtClean="0"/>
-              <a:t>INFDEV016A - G. Costantini, F. Di Giacomo, G. Maggiore</a:t>
+              <a:t>INFDEV026A - G. Costantini, F. Di Giacomo, G. Maggiore</a:t>
             </a:r>
             <a:endParaRPr lang="en-GB"/>
           </a:p>

</xml_diff>